<commit_message>
arquitetura de software e atualização css telas de login
</commit_message>
<xml_diff>
--- a/Documentos/Arquitetura/esboço.pptx
+++ b/Documentos/Arquitetura/esboço.pptx
@@ -4,8 +4,11 @@
   <p:sldMasterIdLst>
     <p:sldMasterId id="2147483648" r:id="rId1"/>
   </p:sldMasterIdLst>
+  <p:notesMasterIdLst>
+    <p:notesMasterId r:id="rId3"/>
+  </p:notesMasterIdLst>
   <p:sldIdLst>
-    <p:sldId id="256" r:id="rId2"/>
+    <p:sldId id="257" r:id="rId2"/>
   </p:sldIdLst>
   <p:sldSz cx="12192000" cy="6858000"/>
   <p:notesSz cx="6858000" cy="9144000"/>
@@ -104,7 +107,445 @@
       </a:defRPr>
     </a:lvl9pPr>
   </p:defaultTextStyle>
+  <p:extLst>
+    <p:ext uri="{EFAFB233-063F-42B5-8137-9DF3F51BA10A}">
+      <p15:sldGuideLst xmlns:p15="http://schemas.microsoft.com/office/powerpoint/2012/main"/>
+    </p:ext>
+  </p:extLst>
 </p:presentation>
+</file>
+
+<file path=ppt/notesMasters/notesMaster1.xml><?xml version="1.0" encoding="utf-8"?>
+<p:notesMaster xmlns:a="http://schemas.openxmlformats.org/drawingml/2006/main" xmlns:r="http://schemas.openxmlformats.org/officeDocument/2006/relationships" xmlns:p="http://schemas.openxmlformats.org/presentationml/2006/main">
+  <p:cSld>
+    <p:bg>
+      <p:bgRef idx="1001">
+        <a:schemeClr val="bg1"/>
+      </p:bgRef>
+    </p:bg>
+    <p:spTree>
+      <p:nvGrpSpPr>
+        <p:cNvPr id="1" name=""/>
+        <p:cNvGrpSpPr/>
+        <p:nvPr/>
+      </p:nvGrpSpPr>
+      <p:grpSpPr>
+        <a:xfrm>
+          <a:off x="0" y="0"/>
+          <a:ext cx="0" cy="0"/>
+          <a:chOff x="0" y="0"/>
+          <a:chExt cx="0" cy="0"/>
+        </a:xfrm>
+      </p:grpSpPr>
+      <p:sp>
+        <p:nvSpPr>
+          <p:cNvPr id="2" name="Espaço Reservado para Cabeçalho 1"/>
+          <p:cNvSpPr>
+            <a:spLocks noGrp="1"/>
+          </p:cNvSpPr>
+          <p:nvPr>
+            <p:ph type="hdr" sz="quarter"/>
+          </p:nvPr>
+        </p:nvSpPr>
+        <p:spPr>
+          <a:xfrm>
+            <a:off x="0" y="0"/>
+            <a:ext cx="2971800" cy="458788"/>
+          </a:xfrm>
+          <a:prstGeom prst="rect">
+            <a:avLst/>
+          </a:prstGeom>
+        </p:spPr>
+        <p:txBody>
+          <a:bodyPr vert="horz" lIns="91440" tIns="45720" rIns="91440" bIns="45720" rtlCol="0"/>
+          <a:lstStyle>
+            <a:lvl1pPr algn="l">
+              <a:defRPr sz="1200"/>
+            </a:lvl1pPr>
+          </a:lstStyle>
+          <a:p>
+            <a:endParaRPr lang="pt-BR"/>
+          </a:p>
+        </p:txBody>
+      </p:sp>
+      <p:sp>
+        <p:nvSpPr>
+          <p:cNvPr id="3" name="Espaço Reservado para Data 2"/>
+          <p:cNvSpPr>
+            <a:spLocks noGrp="1"/>
+          </p:cNvSpPr>
+          <p:nvPr>
+            <p:ph type="dt" idx="1"/>
+          </p:nvPr>
+        </p:nvSpPr>
+        <p:spPr>
+          <a:xfrm>
+            <a:off x="3884613" y="0"/>
+            <a:ext cx="2971800" cy="458788"/>
+          </a:xfrm>
+          <a:prstGeom prst="rect">
+            <a:avLst/>
+          </a:prstGeom>
+        </p:spPr>
+        <p:txBody>
+          <a:bodyPr vert="horz" lIns="91440" tIns="45720" rIns="91440" bIns="45720" rtlCol="0"/>
+          <a:lstStyle>
+            <a:lvl1pPr algn="r">
+              <a:defRPr sz="1200"/>
+            </a:lvl1pPr>
+          </a:lstStyle>
+          <a:p>
+            <a:fld id="{EB78BB11-6ED1-49B1-A157-D60A9F50C8F4}" type="datetimeFigureOut">
+              <a:rPr lang="pt-BR" smtClean="0"/>
+              <a:t>15/10/2021</a:t>
+            </a:fld>
+            <a:endParaRPr lang="pt-BR"/>
+          </a:p>
+        </p:txBody>
+      </p:sp>
+      <p:sp>
+        <p:nvSpPr>
+          <p:cNvPr id="4" name="Espaço Reservado para Imagem de Slide 3"/>
+          <p:cNvSpPr>
+            <a:spLocks noGrp="1" noRot="1" noChangeAspect="1"/>
+          </p:cNvSpPr>
+          <p:nvPr>
+            <p:ph type="sldImg" idx="2"/>
+          </p:nvPr>
+        </p:nvSpPr>
+        <p:spPr>
+          <a:xfrm>
+            <a:off x="685800" y="1143000"/>
+            <a:ext cx="5486400" cy="3086100"/>
+          </a:xfrm>
+          <a:prstGeom prst="rect">
+            <a:avLst/>
+          </a:prstGeom>
+          <a:noFill/>
+          <a:ln w="12700">
+            <a:solidFill>
+              <a:prstClr val="black"/>
+            </a:solidFill>
+          </a:ln>
+        </p:spPr>
+        <p:txBody>
+          <a:bodyPr vert="horz" lIns="91440" tIns="45720" rIns="91440" bIns="45720" rtlCol="0" anchor="ctr"/>
+          <a:lstStyle/>
+          <a:p>
+            <a:endParaRPr lang="pt-BR"/>
+          </a:p>
+        </p:txBody>
+      </p:sp>
+      <p:sp>
+        <p:nvSpPr>
+          <p:cNvPr id="5" name="Espaço Reservado para Anotações 4"/>
+          <p:cNvSpPr>
+            <a:spLocks noGrp="1"/>
+          </p:cNvSpPr>
+          <p:nvPr>
+            <p:ph type="body" sz="quarter" idx="3"/>
+          </p:nvPr>
+        </p:nvSpPr>
+        <p:spPr>
+          <a:xfrm>
+            <a:off x="685800" y="4400550"/>
+            <a:ext cx="5486400" cy="3600450"/>
+          </a:xfrm>
+          <a:prstGeom prst="rect">
+            <a:avLst/>
+          </a:prstGeom>
+        </p:spPr>
+        <p:txBody>
+          <a:bodyPr vert="horz" lIns="91440" tIns="45720" rIns="91440" bIns="45720" rtlCol="0"/>
+          <a:lstStyle/>
+          <a:p>
+            <a:pPr lvl="0"/>
+            <a:r>
+              <a:rPr lang="pt-BR"/>
+              <a:t>Clique para editar os estilos de texto Mestres</a:t>
+            </a:r>
+          </a:p>
+          <a:p>
+            <a:pPr lvl="1"/>
+            <a:r>
+              <a:rPr lang="pt-BR"/>
+              <a:t>Segundo nível</a:t>
+            </a:r>
+          </a:p>
+          <a:p>
+            <a:pPr lvl="2"/>
+            <a:r>
+              <a:rPr lang="pt-BR"/>
+              <a:t>Terceiro nível</a:t>
+            </a:r>
+          </a:p>
+          <a:p>
+            <a:pPr lvl="3"/>
+            <a:r>
+              <a:rPr lang="pt-BR"/>
+              <a:t>Quarto nível</a:t>
+            </a:r>
+          </a:p>
+          <a:p>
+            <a:pPr lvl="4"/>
+            <a:r>
+              <a:rPr lang="pt-BR"/>
+              <a:t>Quinto nível</a:t>
+            </a:r>
+          </a:p>
+        </p:txBody>
+      </p:sp>
+      <p:sp>
+        <p:nvSpPr>
+          <p:cNvPr id="6" name="Espaço Reservado para Rodapé 5"/>
+          <p:cNvSpPr>
+            <a:spLocks noGrp="1"/>
+          </p:cNvSpPr>
+          <p:nvPr>
+            <p:ph type="ftr" sz="quarter" idx="4"/>
+          </p:nvPr>
+        </p:nvSpPr>
+        <p:spPr>
+          <a:xfrm>
+            <a:off x="0" y="8685213"/>
+            <a:ext cx="2971800" cy="458787"/>
+          </a:xfrm>
+          <a:prstGeom prst="rect">
+            <a:avLst/>
+          </a:prstGeom>
+        </p:spPr>
+        <p:txBody>
+          <a:bodyPr vert="horz" lIns="91440" tIns="45720" rIns="91440" bIns="45720" rtlCol="0" anchor="b"/>
+          <a:lstStyle>
+            <a:lvl1pPr algn="l">
+              <a:defRPr sz="1200"/>
+            </a:lvl1pPr>
+          </a:lstStyle>
+          <a:p>
+            <a:endParaRPr lang="pt-BR"/>
+          </a:p>
+        </p:txBody>
+      </p:sp>
+      <p:sp>
+        <p:nvSpPr>
+          <p:cNvPr id="7" name="Espaço Reservado para Número de Slide 6"/>
+          <p:cNvSpPr>
+            <a:spLocks noGrp="1"/>
+          </p:cNvSpPr>
+          <p:nvPr>
+            <p:ph type="sldNum" sz="quarter" idx="5"/>
+          </p:nvPr>
+        </p:nvSpPr>
+        <p:spPr>
+          <a:xfrm>
+            <a:off x="3884613" y="8685213"/>
+            <a:ext cx="2971800" cy="458787"/>
+          </a:xfrm>
+          <a:prstGeom prst="rect">
+            <a:avLst/>
+          </a:prstGeom>
+        </p:spPr>
+        <p:txBody>
+          <a:bodyPr vert="horz" lIns="91440" tIns="45720" rIns="91440" bIns="45720" rtlCol="0" anchor="b"/>
+          <a:lstStyle>
+            <a:lvl1pPr algn="r">
+              <a:defRPr sz="1200"/>
+            </a:lvl1pPr>
+          </a:lstStyle>
+          <a:p>
+            <a:fld id="{0616A3B6-CBB3-43D5-A808-9CBE3DE91CDB}" type="slidenum">
+              <a:rPr lang="pt-BR" smtClean="0"/>
+              <a:t>‹nº›</a:t>
+            </a:fld>
+            <a:endParaRPr lang="pt-BR"/>
+          </a:p>
+        </p:txBody>
+      </p:sp>
+    </p:spTree>
+    <p:extLst>
+      <p:ext uri="{BB962C8B-B14F-4D97-AF65-F5344CB8AC3E}">
+        <p14:creationId xmlns:p14="http://schemas.microsoft.com/office/powerpoint/2010/main" val="1113596282"/>
+      </p:ext>
+    </p:extLst>
+  </p:cSld>
+  <p:clrMap bg1="lt1" tx1="dk1" bg2="lt2" tx2="dk2" accent1="accent1" accent2="accent2" accent3="accent3" accent4="accent4" accent5="accent5" accent6="accent6" hlink="hlink" folHlink="folHlink"/>
+  <p:notesStyle>
+    <a:lvl1pPr marL="0" algn="l" defTabSz="914400" rtl="0" eaLnBrk="1" latinLnBrk="0" hangingPunct="1">
+      <a:defRPr sz="1200" kern="1200">
+        <a:solidFill>
+          <a:schemeClr val="tx1"/>
+        </a:solidFill>
+        <a:latin typeface="+mn-lt"/>
+        <a:ea typeface="+mn-ea"/>
+        <a:cs typeface="+mn-cs"/>
+      </a:defRPr>
+    </a:lvl1pPr>
+    <a:lvl2pPr marL="457200" algn="l" defTabSz="914400" rtl="0" eaLnBrk="1" latinLnBrk="0" hangingPunct="1">
+      <a:defRPr sz="1200" kern="1200">
+        <a:solidFill>
+          <a:schemeClr val="tx1"/>
+        </a:solidFill>
+        <a:latin typeface="+mn-lt"/>
+        <a:ea typeface="+mn-ea"/>
+        <a:cs typeface="+mn-cs"/>
+      </a:defRPr>
+    </a:lvl2pPr>
+    <a:lvl3pPr marL="914400" algn="l" defTabSz="914400" rtl="0" eaLnBrk="1" latinLnBrk="0" hangingPunct="1">
+      <a:defRPr sz="1200" kern="1200">
+        <a:solidFill>
+          <a:schemeClr val="tx1"/>
+        </a:solidFill>
+        <a:latin typeface="+mn-lt"/>
+        <a:ea typeface="+mn-ea"/>
+        <a:cs typeface="+mn-cs"/>
+      </a:defRPr>
+    </a:lvl3pPr>
+    <a:lvl4pPr marL="1371600" algn="l" defTabSz="914400" rtl="0" eaLnBrk="1" latinLnBrk="0" hangingPunct="1">
+      <a:defRPr sz="1200" kern="1200">
+        <a:solidFill>
+          <a:schemeClr val="tx1"/>
+        </a:solidFill>
+        <a:latin typeface="+mn-lt"/>
+        <a:ea typeface="+mn-ea"/>
+        <a:cs typeface="+mn-cs"/>
+      </a:defRPr>
+    </a:lvl4pPr>
+    <a:lvl5pPr marL="1828800" algn="l" defTabSz="914400" rtl="0" eaLnBrk="1" latinLnBrk="0" hangingPunct="1">
+      <a:defRPr sz="1200" kern="1200">
+        <a:solidFill>
+          <a:schemeClr val="tx1"/>
+        </a:solidFill>
+        <a:latin typeface="+mn-lt"/>
+        <a:ea typeface="+mn-ea"/>
+        <a:cs typeface="+mn-cs"/>
+      </a:defRPr>
+    </a:lvl5pPr>
+    <a:lvl6pPr marL="2286000" algn="l" defTabSz="914400" rtl="0" eaLnBrk="1" latinLnBrk="0" hangingPunct="1">
+      <a:defRPr sz="1200" kern="1200">
+        <a:solidFill>
+          <a:schemeClr val="tx1"/>
+        </a:solidFill>
+        <a:latin typeface="+mn-lt"/>
+        <a:ea typeface="+mn-ea"/>
+        <a:cs typeface="+mn-cs"/>
+      </a:defRPr>
+    </a:lvl6pPr>
+    <a:lvl7pPr marL="2743200" algn="l" defTabSz="914400" rtl="0" eaLnBrk="1" latinLnBrk="0" hangingPunct="1">
+      <a:defRPr sz="1200" kern="1200">
+        <a:solidFill>
+          <a:schemeClr val="tx1"/>
+        </a:solidFill>
+        <a:latin typeface="+mn-lt"/>
+        <a:ea typeface="+mn-ea"/>
+        <a:cs typeface="+mn-cs"/>
+      </a:defRPr>
+    </a:lvl7pPr>
+    <a:lvl8pPr marL="3200400" algn="l" defTabSz="914400" rtl="0" eaLnBrk="1" latinLnBrk="0" hangingPunct="1">
+      <a:defRPr sz="1200" kern="1200">
+        <a:solidFill>
+          <a:schemeClr val="tx1"/>
+        </a:solidFill>
+        <a:latin typeface="+mn-lt"/>
+        <a:ea typeface="+mn-ea"/>
+        <a:cs typeface="+mn-cs"/>
+      </a:defRPr>
+    </a:lvl8pPr>
+    <a:lvl9pPr marL="3657600" algn="l" defTabSz="914400" rtl="0" eaLnBrk="1" latinLnBrk="0" hangingPunct="1">
+      <a:defRPr sz="1200" kern="1200">
+        <a:solidFill>
+          <a:schemeClr val="tx1"/>
+        </a:solidFill>
+        <a:latin typeface="+mn-lt"/>
+        <a:ea typeface="+mn-ea"/>
+        <a:cs typeface="+mn-cs"/>
+      </a:defRPr>
+    </a:lvl9pPr>
+  </p:notesStyle>
+</p:notesMaster>
+</file>
+
+<file path=ppt/notesSlides/notesSlide1.xml><?xml version="1.0" encoding="utf-8"?>
+<p:notes xmlns:a="http://schemas.openxmlformats.org/drawingml/2006/main" xmlns:r="http://schemas.openxmlformats.org/officeDocument/2006/relationships" xmlns:p="http://schemas.openxmlformats.org/presentationml/2006/main">
+  <p:cSld>
+    <p:spTree>
+      <p:nvGrpSpPr>
+        <p:cNvPr id="1" name=""/>
+        <p:cNvGrpSpPr/>
+        <p:nvPr/>
+      </p:nvGrpSpPr>
+      <p:grpSpPr>
+        <a:xfrm>
+          <a:off x="0" y="0"/>
+          <a:ext cx="0" cy="0"/>
+          <a:chOff x="0" y="0"/>
+          <a:chExt cx="0" cy="0"/>
+        </a:xfrm>
+      </p:grpSpPr>
+      <p:sp>
+        <p:nvSpPr>
+          <p:cNvPr id="2" name="Espaço Reservado para Imagem de Slide 1"/>
+          <p:cNvSpPr>
+            <a:spLocks noGrp="1" noRot="1" noChangeAspect="1"/>
+          </p:cNvSpPr>
+          <p:nvPr>
+            <p:ph type="sldImg"/>
+          </p:nvPr>
+        </p:nvSpPr>
+        <p:spPr/>
+      </p:sp>
+      <p:sp>
+        <p:nvSpPr>
+          <p:cNvPr id="3" name="Espaço Reservado para Anotações 2"/>
+          <p:cNvSpPr>
+            <a:spLocks noGrp="1"/>
+          </p:cNvSpPr>
+          <p:nvPr>
+            <p:ph type="body" idx="1"/>
+          </p:nvPr>
+        </p:nvSpPr>
+        <p:spPr/>
+        <p:txBody>
+          <a:bodyPr/>
+          <a:lstStyle/>
+          <a:p>
+            <a:endParaRPr lang="pt-BR" dirty="0"/>
+          </a:p>
+        </p:txBody>
+      </p:sp>
+      <p:sp>
+        <p:nvSpPr>
+          <p:cNvPr id="4" name="Espaço Reservado para Número de Slide 3"/>
+          <p:cNvSpPr>
+            <a:spLocks noGrp="1"/>
+          </p:cNvSpPr>
+          <p:nvPr>
+            <p:ph type="sldNum" sz="quarter" idx="5"/>
+          </p:nvPr>
+        </p:nvSpPr>
+        <p:spPr/>
+        <p:txBody>
+          <a:bodyPr/>
+          <a:lstStyle/>
+          <a:p>
+            <a:fld id="{0616A3B6-CBB3-43D5-A808-9CBE3DE91CDB}" type="slidenum">
+              <a:rPr lang="pt-BR" smtClean="0"/>
+              <a:t>1</a:t>
+            </a:fld>
+            <a:endParaRPr lang="pt-BR"/>
+          </a:p>
+        </p:txBody>
+      </p:sp>
+    </p:spTree>
+    <p:extLst>
+      <p:ext uri="{BB962C8B-B14F-4D97-AF65-F5344CB8AC3E}">
+        <p14:creationId xmlns:p14="http://schemas.microsoft.com/office/powerpoint/2010/main" val="2048223902"/>
+      </p:ext>
+    </p:extLst>
+  </p:cSld>
+  <p:clrMapOvr>
+    <a:masterClrMapping/>
+  </p:clrMapOvr>
+</p:notes>
 </file>
 
 <file path=ppt/slideLayouts/slideLayout1.xml><?xml version="1.0" encoding="utf-8"?>
@@ -254,7 +695,7 @@
           <a:p>
             <a:fld id="{FDFA6A10-170F-4F7E-8A19-AA410CAE3664}" type="datetimeFigureOut">
               <a:rPr lang="pt-BR" smtClean="0"/>
-              <a:t>14/10/2021</a:t>
+              <a:t>15/10/2021</a:t>
             </a:fld>
             <a:endParaRPr lang="pt-BR"/>
           </a:p>
@@ -452,7 +893,7 @@
           <a:p>
             <a:fld id="{FDFA6A10-170F-4F7E-8A19-AA410CAE3664}" type="datetimeFigureOut">
               <a:rPr lang="pt-BR" smtClean="0"/>
-              <a:t>14/10/2021</a:t>
+              <a:t>15/10/2021</a:t>
             </a:fld>
             <a:endParaRPr lang="pt-BR"/>
           </a:p>
@@ -660,7 +1101,7 @@
           <a:p>
             <a:fld id="{FDFA6A10-170F-4F7E-8A19-AA410CAE3664}" type="datetimeFigureOut">
               <a:rPr lang="pt-BR" smtClean="0"/>
-              <a:t>14/10/2021</a:t>
+              <a:t>15/10/2021</a:t>
             </a:fld>
             <a:endParaRPr lang="pt-BR"/>
           </a:p>
@@ -858,7 +1299,7 @@
           <a:p>
             <a:fld id="{FDFA6A10-170F-4F7E-8A19-AA410CAE3664}" type="datetimeFigureOut">
               <a:rPr lang="pt-BR" smtClean="0"/>
-              <a:t>14/10/2021</a:t>
+              <a:t>15/10/2021</a:t>
             </a:fld>
             <a:endParaRPr lang="pt-BR"/>
           </a:p>
@@ -1133,7 +1574,7 @@
           <a:p>
             <a:fld id="{FDFA6A10-170F-4F7E-8A19-AA410CAE3664}" type="datetimeFigureOut">
               <a:rPr lang="pt-BR" smtClean="0"/>
-              <a:t>14/10/2021</a:t>
+              <a:t>15/10/2021</a:t>
             </a:fld>
             <a:endParaRPr lang="pt-BR"/>
           </a:p>
@@ -1398,7 +1839,7 @@
           <a:p>
             <a:fld id="{FDFA6A10-170F-4F7E-8A19-AA410CAE3664}" type="datetimeFigureOut">
               <a:rPr lang="pt-BR" smtClean="0"/>
-              <a:t>14/10/2021</a:t>
+              <a:t>15/10/2021</a:t>
             </a:fld>
             <a:endParaRPr lang="pt-BR"/>
           </a:p>
@@ -1810,7 +2251,7 @@
           <a:p>
             <a:fld id="{FDFA6A10-170F-4F7E-8A19-AA410CAE3664}" type="datetimeFigureOut">
               <a:rPr lang="pt-BR" smtClean="0"/>
-              <a:t>14/10/2021</a:t>
+              <a:t>15/10/2021</a:t>
             </a:fld>
             <a:endParaRPr lang="pt-BR"/>
           </a:p>
@@ -1951,7 +2392,7 @@
           <a:p>
             <a:fld id="{FDFA6A10-170F-4F7E-8A19-AA410CAE3664}" type="datetimeFigureOut">
               <a:rPr lang="pt-BR" smtClean="0"/>
-              <a:t>14/10/2021</a:t>
+              <a:t>15/10/2021</a:t>
             </a:fld>
             <a:endParaRPr lang="pt-BR"/>
           </a:p>
@@ -2064,7 +2505,7 @@
           <a:p>
             <a:fld id="{FDFA6A10-170F-4F7E-8A19-AA410CAE3664}" type="datetimeFigureOut">
               <a:rPr lang="pt-BR" smtClean="0"/>
-              <a:t>14/10/2021</a:t>
+              <a:t>15/10/2021</a:t>
             </a:fld>
             <a:endParaRPr lang="pt-BR"/>
           </a:p>
@@ -2375,7 +2816,7 @@
           <a:p>
             <a:fld id="{FDFA6A10-170F-4F7E-8A19-AA410CAE3664}" type="datetimeFigureOut">
               <a:rPr lang="pt-BR" smtClean="0"/>
-              <a:t>14/10/2021</a:t>
+              <a:t>15/10/2021</a:t>
             </a:fld>
             <a:endParaRPr lang="pt-BR"/>
           </a:p>
@@ -2663,7 +3104,7 @@
           <a:p>
             <a:fld id="{FDFA6A10-170F-4F7E-8A19-AA410CAE3664}" type="datetimeFigureOut">
               <a:rPr lang="pt-BR" smtClean="0"/>
-              <a:t>14/10/2021</a:t>
+              <a:t>15/10/2021</a:t>
             </a:fld>
             <a:endParaRPr lang="pt-BR"/>
           </a:p>
@@ -2904,7 +3345,7 @@
           <a:p>
             <a:fld id="{FDFA6A10-170F-4F7E-8A19-AA410CAE3664}" type="datetimeFigureOut">
               <a:rPr lang="pt-BR" smtClean="0"/>
-              <a:t>14/10/2021</a:t>
+              <a:t>15/10/2021</a:t>
             </a:fld>
             <a:endParaRPr lang="pt-BR"/>
           </a:p>
@@ -3321,12 +3762,178 @@
           <a:chExt cx="0" cy="0"/>
         </a:xfrm>
       </p:grpSpPr>
+      <p:cxnSp>
+        <p:nvCxnSpPr>
+          <p:cNvPr id="100" name="Conector de Seta Reta 99">
+            <a:extLst>
+              <a:ext uri="{FF2B5EF4-FFF2-40B4-BE49-F238E27FC236}">
+                <a16:creationId xmlns:a16="http://schemas.microsoft.com/office/drawing/2014/main" id="{A3583B6E-902C-4674-89ED-44F61664A5FF}"/>
+              </a:ext>
+            </a:extLst>
+          </p:cNvPr>
+          <p:cNvCxnSpPr>
+            <a:cxnSpLocks/>
+            <a:endCxn id="84" idx="4"/>
+          </p:cNvCxnSpPr>
+          <p:nvPr/>
+        </p:nvCxnSpPr>
+        <p:spPr>
+          <a:xfrm flipH="1" flipV="1">
+            <a:off x="5048641" y="1639663"/>
+            <a:ext cx="1649196" cy="1046266"/>
+          </a:xfrm>
+          <a:prstGeom prst="straightConnector1">
+            <a:avLst/>
+          </a:prstGeom>
+          <a:ln w="19050">
+            <a:solidFill>
+              <a:schemeClr val="accent5">
+                <a:lumMod val="75000"/>
+              </a:schemeClr>
+            </a:solidFill>
+            <a:prstDash val="sysDash"/>
+            <a:headEnd type="none" w="lg" len="lg"/>
+            <a:tailEnd type="triangle" w="lg" len="lg"/>
+          </a:ln>
+          <a:effectLst>
+            <a:outerShdw blurRad="50800" dist="38100" dir="2700000" algn="tl" rotWithShape="0">
+              <a:prstClr val="black">
+                <a:alpha val="40000"/>
+              </a:prstClr>
+            </a:outerShdw>
+          </a:effectLst>
+        </p:spPr>
+        <p:style>
+          <a:lnRef idx="1">
+            <a:schemeClr val="accent1"/>
+          </a:lnRef>
+          <a:fillRef idx="0">
+            <a:schemeClr val="accent1"/>
+          </a:fillRef>
+          <a:effectRef idx="0">
+            <a:schemeClr val="accent1"/>
+          </a:effectRef>
+          <a:fontRef idx="minor">
+            <a:schemeClr val="tx1"/>
+          </a:fontRef>
+        </p:style>
+      </p:cxnSp>
+      <p:cxnSp>
+        <p:nvCxnSpPr>
+          <p:cNvPr id="121" name="Conector de Seta Reta 120">
+            <a:extLst>
+              <a:ext uri="{FF2B5EF4-FFF2-40B4-BE49-F238E27FC236}">
+                <a16:creationId xmlns:a16="http://schemas.microsoft.com/office/drawing/2014/main" id="{F652AE9A-495A-419C-9956-5DAA910F2C10}"/>
+              </a:ext>
+            </a:extLst>
+          </p:cNvPr>
+          <p:cNvCxnSpPr>
+            <a:cxnSpLocks/>
+          </p:cNvCxnSpPr>
+          <p:nvPr/>
+        </p:nvCxnSpPr>
+        <p:spPr>
+          <a:xfrm flipV="1">
+            <a:off x="891396" y="3705778"/>
+            <a:ext cx="0" cy="1034981"/>
+          </a:xfrm>
+          <a:prstGeom prst="straightConnector1">
+            <a:avLst/>
+          </a:prstGeom>
+          <a:ln w="19050">
+            <a:solidFill>
+              <a:schemeClr val="accent5">
+                <a:lumMod val="75000"/>
+              </a:schemeClr>
+            </a:solidFill>
+            <a:prstDash val="sysDash"/>
+            <a:headEnd type="none" w="lg" len="lg"/>
+            <a:tailEnd type="triangle" w="lg" len="lg"/>
+          </a:ln>
+          <a:effectLst>
+            <a:outerShdw blurRad="50800" dist="38100" dir="2700000" algn="tl" rotWithShape="0">
+              <a:prstClr val="black">
+                <a:alpha val="40000"/>
+              </a:prstClr>
+            </a:outerShdw>
+          </a:effectLst>
+        </p:spPr>
+        <p:style>
+          <a:lnRef idx="1">
+            <a:schemeClr val="accent1"/>
+          </a:lnRef>
+          <a:fillRef idx="0">
+            <a:schemeClr val="accent1"/>
+          </a:fillRef>
+          <a:effectRef idx="0">
+            <a:schemeClr val="accent1"/>
+          </a:effectRef>
+          <a:fontRef idx="minor">
+            <a:schemeClr val="tx1"/>
+          </a:fontRef>
+        </p:style>
+      </p:cxnSp>
+      <p:cxnSp>
+        <p:nvCxnSpPr>
+          <p:cNvPr id="71" name="Conector de Seta Reta 70">
+            <a:extLst>
+              <a:ext uri="{FF2B5EF4-FFF2-40B4-BE49-F238E27FC236}">
+                <a16:creationId xmlns:a16="http://schemas.microsoft.com/office/drawing/2014/main" id="{75AF9792-45C5-4EDC-86F4-3BC4CBE4D8CE}"/>
+              </a:ext>
+            </a:extLst>
+          </p:cNvPr>
+          <p:cNvCxnSpPr>
+            <a:cxnSpLocks/>
+          </p:cNvCxnSpPr>
+          <p:nvPr/>
+        </p:nvCxnSpPr>
+        <p:spPr>
+          <a:xfrm flipV="1">
+            <a:off x="3864019" y="2666144"/>
+            <a:ext cx="1" cy="1844675"/>
+          </a:xfrm>
+          <a:prstGeom prst="straightConnector1">
+            <a:avLst/>
+          </a:prstGeom>
+          <a:ln w="19050">
+            <a:solidFill>
+              <a:schemeClr val="accent5">
+                <a:lumMod val="75000"/>
+              </a:schemeClr>
+            </a:solidFill>
+            <a:prstDash val="sysDash"/>
+            <a:headEnd type="none" w="lg" len="lg"/>
+            <a:tailEnd type="triangle" w="lg" len="lg"/>
+          </a:ln>
+          <a:effectLst>
+            <a:outerShdw blurRad="50800" dist="38100" dir="2700000" algn="tl" rotWithShape="0">
+              <a:prstClr val="black">
+                <a:alpha val="40000"/>
+              </a:prstClr>
+            </a:outerShdw>
+          </a:effectLst>
+        </p:spPr>
+        <p:style>
+          <a:lnRef idx="1">
+            <a:schemeClr val="accent1"/>
+          </a:lnRef>
+          <a:fillRef idx="0">
+            <a:schemeClr val="accent1"/>
+          </a:fillRef>
+          <a:effectRef idx="0">
+            <a:schemeClr val="accent1"/>
+          </a:effectRef>
+          <a:fontRef idx="minor">
+            <a:schemeClr val="tx1"/>
+          </a:fontRef>
+        </p:style>
+      </p:cxnSp>
       <p:grpSp>
         <p:nvGrpSpPr>
-          <p:cNvPr id="8" name="Agrupar 7">
-            <a:extLst>
-              <a:ext uri="{FF2B5EF4-FFF2-40B4-BE49-F238E27FC236}">
-                <a16:creationId xmlns:a16="http://schemas.microsoft.com/office/drawing/2014/main" id="{CF0A84EE-94F8-4B9C-844B-CC0FA2396E46}"/>
+          <p:cNvPr id="72" name="Group 38">
+            <a:extLst>
+              <a:ext uri="{FF2B5EF4-FFF2-40B4-BE49-F238E27FC236}">
+                <a16:creationId xmlns:a16="http://schemas.microsoft.com/office/drawing/2014/main" id="{F0E83028-318A-4D2F-83A3-D3200DE7BBFE}"/>
               </a:ext>
             </a:extLst>
           </p:cNvPr>
@@ -3335,18 +3942,28 @@
         </p:nvGrpSpPr>
         <p:grpSpPr>
           <a:xfrm>
-            <a:off x="493407" y="1695615"/>
-            <a:ext cx="6144243" cy="4166671"/>
-            <a:chOff x="157848" y="2542903"/>
-            <a:chExt cx="6144243" cy="4166671"/>
+            <a:off x="2647503" y="3732647"/>
+            <a:ext cx="2566458" cy="2016224"/>
+            <a:chOff x="8768407" y="1501253"/>
+            <a:chExt cx="2566458" cy="2016224"/>
           </a:xfrm>
+          <a:solidFill>
+            <a:srgbClr val="278CAD"/>
+          </a:solidFill>
+          <a:effectLst>
+            <a:outerShdw blurRad="50800" dist="38100" dir="2700000" algn="tl" rotWithShape="0">
+              <a:prstClr val="black">
+                <a:alpha val="40000"/>
+              </a:prstClr>
+            </a:outerShdw>
+          </a:effectLst>
         </p:grpSpPr>
         <p:sp>
           <p:nvSpPr>
-            <p:cNvPr id="9" name="Retângulo 29">
+            <p:cNvPr id="73" name="Retângulo 72">
               <a:extLst>
                 <a:ext uri="{FF2B5EF4-FFF2-40B4-BE49-F238E27FC236}">
-                  <a16:creationId xmlns:a16="http://schemas.microsoft.com/office/drawing/2014/main" id="{1BB142EB-E8A2-4671-81FF-BDAA414D7E99}"/>
+                  <a16:creationId xmlns:a16="http://schemas.microsoft.com/office/drawing/2014/main" id="{1CEB9777-FDE6-49E3-A765-6B979003FDD9}"/>
                 </a:ext>
               </a:extLst>
             </p:cNvPr>
@@ -3355,17 +3972,740 @@
           </p:nvSpPr>
           <p:spPr>
             <a:xfrm>
-              <a:off x="3830217" y="4693351"/>
+              <a:off x="8843374" y="1501253"/>
+              <a:ext cx="2376264" cy="2016224"/>
+            </a:xfrm>
+            <a:prstGeom prst="rect">
+              <a:avLst/>
+            </a:prstGeom>
+            <a:grpFill/>
+            <a:ln/>
+          </p:spPr>
+          <p:style>
+            <a:lnRef idx="2">
+              <a:schemeClr val="accent5">
+                <a:shade val="50000"/>
+              </a:schemeClr>
+            </a:lnRef>
+            <a:fillRef idx="1">
+              <a:schemeClr val="accent5"/>
+            </a:fillRef>
+            <a:effectRef idx="0">
+              <a:schemeClr val="accent5"/>
+            </a:effectRef>
+            <a:fontRef idx="minor">
+              <a:schemeClr val="lt1"/>
+            </a:fontRef>
+          </p:style>
+          <p:txBody>
+            <a:bodyPr rtlCol="0" anchor="ctr"/>
+            <a:lstStyle/>
+            <a:p>
+              <a:pPr algn="ctr"/>
+              <a:endParaRPr lang="pt-BR" sz="1800" dirty="0">
+                <a:solidFill>
+                  <a:prstClr val="white"/>
+                </a:solidFill>
+                <a:latin typeface="Calibri"/>
+              </a:endParaRPr>
+            </a:p>
+          </p:txBody>
+        </p:sp>
+        <p:sp>
+          <p:nvSpPr>
+            <p:cNvPr id="74" name="Retângulo 73">
+              <a:extLst>
+                <a:ext uri="{FF2B5EF4-FFF2-40B4-BE49-F238E27FC236}">
+                  <a16:creationId xmlns:a16="http://schemas.microsoft.com/office/drawing/2014/main" id="{3F5E7506-183A-45FC-A174-887AC4B80DD9}"/>
+                </a:ext>
+              </a:extLst>
+            </p:cNvPr>
+            <p:cNvSpPr/>
+            <p:nvPr/>
+          </p:nvSpPr>
+          <p:spPr>
+            <a:xfrm>
+              <a:off x="8768407" y="1771957"/>
+              <a:ext cx="2566458" cy="1631216"/>
+            </a:xfrm>
+            <a:prstGeom prst="rect">
+              <a:avLst/>
+            </a:prstGeom>
+            <a:noFill/>
+          </p:spPr>
+          <p:txBody>
+            <a:bodyPr wrap="square">
+              <a:spAutoFit/>
+            </a:bodyPr>
+            <a:lstStyle/>
+            <a:p>
+              <a:pPr lvl="0" algn="ctr">
+                <a:defRPr/>
+              </a:pPr>
+              <a:r>
+                <a:rPr lang="pt-BR" sz="2000" b="1" dirty="0">
+                  <a:solidFill>
+                    <a:prstClr val="white"/>
+                  </a:solidFill>
+                </a:rPr>
+                <a:t>Microservice </a:t>
+              </a:r>
+            </a:p>
+            <a:p>
+              <a:pPr lvl="0" algn="ctr">
+                <a:defRPr/>
+              </a:pPr>
+              <a:r>
+                <a:rPr lang="pt-BR" sz="1600" dirty="0">
+                  <a:solidFill>
+                    <a:prstClr val="white"/>
+                  </a:solidFill>
+                </a:rPr>
+                <a:t>[Container: Spring Boot]</a:t>
+              </a:r>
+            </a:p>
+            <a:p>
+              <a:pPr lvl="0" algn="ctr">
+                <a:defRPr/>
+              </a:pPr>
+              <a:endParaRPr lang="pt-BR" sz="1600" dirty="0">
+                <a:solidFill>
+                  <a:prstClr val="white"/>
+                </a:solidFill>
+              </a:endParaRPr>
+            </a:p>
+            <a:p>
+              <a:pPr algn="ctr">
+                <a:defRPr/>
+              </a:pPr>
+              <a:r>
+                <a:rPr lang="pt-BR" sz="1600" dirty="0">
+                  <a:solidFill>
+                    <a:prstClr val="white"/>
+                  </a:solidFill>
+                </a:rPr>
+                <a:t>Backend da aplicação e tratamento  </a:t>
+              </a:r>
+              <a:endParaRPr lang="pt-BR" sz="1200" dirty="0">
+                <a:solidFill>
+                  <a:prstClr val="white"/>
+                </a:solidFill>
+              </a:endParaRPr>
+            </a:p>
+            <a:p>
+              <a:pPr lvl="0" algn="ctr">
+                <a:defRPr/>
+              </a:pPr>
+              <a:endParaRPr lang="pt-BR" sz="1600" dirty="0">
+                <a:solidFill>
+                  <a:prstClr val="white"/>
+                </a:solidFill>
+              </a:endParaRPr>
+            </a:p>
+          </p:txBody>
+        </p:sp>
+      </p:grpSp>
+      <p:grpSp>
+        <p:nvGrpSpPr>
+          <p:cNvPr id="76" name="Group 36">
+            <a:extLst>
+              <a:ext uri="{FF2B5EF4-FFF2-40B4-BE49-F238E27FC236}">
+                <a16:creationId xmlns:a16="http://schemas.microsoft.com/office/drawing/2014/main" id="{17D170F2-3B62-4E27-9016-45C81F757066}"/>
+              </a:ext>
+            </a:extLst>
+          </p:cNvPr>
+          <p:cNvGrpSpPr/>
+          <p:nvPr/>
+        </p:nvGrpSpPr>
+        <p:grpSpPr>
+          <a:xfrm>
+            <a:off x="6302105" y="1398958"/>
+            <a:ext cx="2463284" cy="2050788"/>
+            <a:chOff x="7149336" y="4654462"/>
+            <a:chExt cx="2463284" cy="2050788"/>
+          </a:xfrm>
+          <a:effectLst>
+            <a:outerShdw blurRad="50800" dist="38100" dir="2700000" algn="tl" rotWithShape="0">
+              <a:prstClr val="black">
+                <a:alpha val="40000"/>
+              </a:prstClr>
+            </a:outerShdw>
+          </a:effectLst>
+        </p:grpSpPr>
+        <p:grpSp>
+          <p:nvGrpSpPr>
+            <p:cNvPr id="77" name="Group 22">
+              <a:extLst>
+                <a:ext uri="{FF2B5EF4-FFF2-40B4-BE49-F238E27FC236}">
+                  <a16:creationId xmlns:a16="http://schemas.microsoft.com/office/drawing/2014/main" id="{87D8BEFA-501E-4612-A2DB-40CDE6E6D3A8}"/>
+                </a:ext>
+              </a:extLst>
+            </p:cNvPr>
+            <p:cNvGrpSpPr/>
+            <p:nvPr/>
+          </p:nvGrpSpPr>
+          <p:grpSpPr>
+            <a:xfrm>
+              <a:off x="7149337" y="4654462"/>
+              <a:ext cx="2463283" cy="2016225"/>
+              <a:chOff x="8392958" y="3891083"/>
+              <a:chExt cx="3276202" cy="2212133"/>
+            </a:xfrm>
+          </p:grpSpPr>
+          <p:sp>
+            <p:nvSpPr>
+              <p:cNvPr id="79" name="Retângulo 6">
+                <a:extLst>
+                  <a:ext uri="{FF2B5EF4-FFF2-40B4-BE49-F238E27FC236}">
+                    <a16:creationId xmlns:a16="http://schemas.microsoft.com/office/drawing/2014/main" id="{93340684-DACD-4E85-8F98-98CEB8C2E660}"/>
+                  </a:ext>
+                </a:extLst>
+              </p:cNvPr>
+              <p:cNvSpPr/>
+              <p:nvPr/>
+            </p:nvSpPr>
+            <p:spPr>
+              <a:xfrm>
+                <a:off x="8392958" y="3891083"/>
+                <a:ext cx="3276202" cy="2212133"/>
+              </a:xfrm>
+              <a:prstGeom prst="rect">
+                <a:avLst/>
+              </a:prstGeom>
+              <a:solidFill>
+                <a:srgbClr val="08376B"/>
+              </a:solidFill>
+              <a:ln>
+                <a:solidFill>
+                  <a:schemeClr val="bg1"/>
+                </a:solidFill>
+              </a:ln>
+            </p:spPr>
+            <p:style>
+              <a:lnRef idx="2">
+                <a:schemeClr val="accent1">
+                  <a:shade val="50000"/>
+                </a:schemeClr>
+              </a:lnRef>
+              <a:fillRef idx="1">
+                <a:schemeClr val="accent1"/>
+              </a:fillRef>
+              <a:effectRef idx="0">
+                <a:schemeClr val="accent1"/>
+              </a:effectRef>
+              <a:fontRef idx="minor">
+                <a:schemeClr val="lt1"/>
+              </a:fontRef>
+            </p:style>
+            <p:txBody>
+              <a:bodyPr rtlCol="0" anchor="ctr"/>
+              <a:lstStyle/>
+              <a:p>
+                <a:pPr algn="ctr"/>
+                <a:endParaRPr lang="pt-BR" dirty="0">
+                  <a:solidFill>
+                    <a:prstClr val="white"/>
+                  </a:solidFill>
+                  <a:highlight>
+                    <a:srgbClr val="08376B"/>
+                  </a:highlight>
+                  <a:latin typeface="Calibri"/>
+                </a:endParaRPr>
+              </a:p>
+            </p:txBody>
+          </p:sp>
+          <p:sp>
+            <p:nvSpPr>
+              <p:cNvPr id="80" name="Retângulo 6">
+                <a:extLst>
+                  <a:ext uri="{FF2B5EF4-FFF2-40B4-BE49-F238E27FC236}">
+                    <a16:creationId xmlns:a16="http://schemas.microsoft.com/office/drawing/2014/main" id="{E7C256C9-34F0-44B8-BD4F-5317E5502E34}"/>
+                  </a:ext>
+                </a:extLst>
+              </p:cNvPr>
+              <p:cNvSpPr/>
+              <p:nvPr/>
+            </p:nvSpPr>
+            <p:spPr>
+              <a:xfrm>
+                <a:off x="8464949" y="3959113"/>
+                <a:ext cx="2577005" cy="226900"/>
+              </a:xfrm>
+              <a:prstGeom prst="rect">
+                <a:avLst/>
+              </a:prstGeom>
+              <a:noFill/>
+              <a:ln>
+                <a:solidFill>
+                  <a:schemeClr val="bg1"/>
+                </a:solidFill>
+              </a:ln>
+            </p:spPr>
+            <p:style>
+              <a:lnRef idx="2">
+                <a:schemeClr val="accent1">
+                  <a:shade val="50000"/>
+                </a:schemeClr>
+              </a:lnRef>
+              <a:fillRef idx="1">
+                <a:schemeClr val="accent1"/>
+              </a:fillRef>
+              <a:effectRef idx="0">
+                <a:schemeClr val="accent1"/>
+              </a:effectRef>
+              <a:fontRef idx="minor">
+                <a:schemeClr val="lt1"/>
+              </a:fontRef>
+            </p:style>
+            <p:txBody>
+              <a:bodyPr rtlCol="0" anchor="ctr"/>
+              <a:lstStyle/>
+              <a:p>
+                <a:pPr algn="ctr"/>
+                <a:endParaRPr lang="pt-BR" dirty="0">
+                  <a:solidFill>
+                    <a:prstClr val="white"/>
+                  </a:solidFill>
+                  <a:latin typeface="Calibri"/>
+                </a:endParaRPr>
+              </a:p>
+            </p:txBody>
+          </p:sp>
+          <p:sp>
+            <p:nvSpPr>
+              <p:cNvPr id="81" name="Multiply 18">
+                <a:extLst>
+                  <a:ext uri="{FF2B5EF4-FFF2-40B4-BE49-F238E27FC236}">
+                    <a16:creationId xmlns:a16="http://schemas.microsoft.com/office/drawing/2014/main" id="{35A604FF-2416-4596-9231-F56184B6311F}"/>
+                  </a:ext>
+                </a:extLst>
+              </p:cNvPr>
+              <p:cNvSpPr/>
+              <p:nvPr/>
+            </p:nvSpPr>
+            <p:spPr>
+              <a:xfrm>
+                <a:off x="11309204" y="3924647"/>
+                <a:ext cx="288032" cy="295831"/>
+              </a:xfrm>
+              <a:prstGeom prst="mathMultiply">
+                <a:avLst/>
+              </a:prstGeom>
+              <a:noFill/>
+              <a:ln>
+                <a:solidFill>
+                  <a:schemeClr val="bg1"/>
+                </a:solidFill>
+              </a:ln>
+            </p:spPr>
+            <p:style>
+              <a:lnRef idx="2">
+                <a:schemeClr val="accent1">
+                  <a:shade val="50000"/>
+                </a:schemeClr>
+              </a:lnRef>
+              <a:fillRef idx="1">
+                <a:schemeClr val="accent1"/>
+              </a:fillRef>
+              <a:effectRef idx="0">
+                <a:schemeClr val="accent1"/>
+              </a:effectRef>
+              <a:fontRef idx="minor">
+                <a:schemeClr val="lt1"/>
+              </a:fontRef>
+            </p:style>
+            <p:txBody>
+              <a:bodyPr rtlCol="0" anchor="ctr"/>
+              <a:lstStyle/>
+              <a:p>
+                <a:pPr algn="ctr"/>
+                <a:endParaRPr lang="pt-BR"/>
+              </a:p>
+            </p:txBody>
+          </p:sp>
+          <p:sp>
+            <p:nvSpPr>
+              <p:cNvPr id="82" name="Circular Arrow 19">
+                <a:extLst>
+                  <a:ext uri="{FF2B5EF4-FFF2-40B4-BE49-F238E27FC236}">
+                    <a16:creationId xmlns:a16="http://schemas.microsoft.com/office/drawing/2014/main" id="{D9804BE0-B906-41C1-82C4-C515E5556AB3}"/>
+                  </a:ext>
+                </a:extLst>
+              </p:cNvPr>
+              <p:cNvSpPr/>
+              <p:nvPr/>
+            </p:nvSpPr>
+            <p:spPr>
+              <a:xfrm rot="16500000">
+                <a:off x="11158829" y="3927941"/>
+                <a:ext cx="216000" cy="288000"/>
+              </a:xfrm>
+              <a:prstGeom prst="circularArrow">
+                <a:avLst/>
+              </a:prstGeom>
+              <a:noFill/>
+              <a:ln>
+                <a:solidFill>
+                  <a:schemeClr val="bg1"/>
+                </a:solidFill>
+              </a:ln>
+            </p:spPr>
+            <p:style>
+              <a:lnRef idx="2">
+                <a:schemeClr val="accent1">
+                  <a:shade val="50000"/>
+                </a:schemeClr>
+              </a:lnRef>
+              <a:fillRef idx="1">
+                <a:schemeClr val="accent1"/>
+              </a:fillRef>
+              <a:effectRef idx="0">
+                <a:schemeClr val="accent1"/>
+              </a:effectRef>
+              <a:fontRef idx="minor">
+                <a:schemeClr val="lt1"/>
+              </a:fontRef>
+            </p:style>
+            <p:txBody>
+              <a:bodyPr rtlCol="0" anchor="ctr"/>
+              <a:lstStyle/>
+              <a:p>
+                <a:pPr algn="ctr"/>
+                <a:endParaRPr lang="pt-BR">
+                  <a:solidFill>
+                    <a:schemeClr val="tx1"/>
+                  </a:solidFill>
+                </a:endParaRPr>
+              </a:p>
+            </p:txBody>
+          </p:sp>
+        </p:grpSp>
+        <p:sp>
+          <p:nvSpPr>
+            <p:cNvPr id="78" name="Retângulo 20">
+              <a:extLst>
+                <a:ext uri="{FF2B5EF4-FFF2-40B4-BE49-F238E27FC236}">
+                  <a16:creationId xmlns:a16="http://schemas.microsoft.com/office/drawing/2014/main" id="{8799EC83-0AFC-4261-A537-307887A70A90}"/>
+                </a:ext>
+              </a:extLst>
+            </p:cNvPr>
+            <p:cNvSpPr/>
+            <p:nvPr/>
+          </p:nvSpPr>
+          <p:spPr>
+            <a:xfrm>
+              <a:off x="7149336" y="5012479"/>
+              <a:ext cx="2427775" cy="1692771"/>
+            </a:xfrm>
+            <a:prstGeom prst="rect">
+              <a:avLst/>
+            </a:prstGeom>
+          </p:spPr>
+          <p:txBody>
+            <a:bodyPr wrap="square">
+              <a:spAutoFit/>
+            </a:bodyPr>
+            <a:lstStyle/>
+            <a:p>
+              <a:pPr lvl="0" algn="ctr">
+                <a:defRPr/>
+              </a:pPr>
+              <a:r>
+                <a:rPr lang="pt-BR" sz="2000" b="1" dirty="0">
+                  <a:solidFill>
+                    <a:prstClr val="white"/>
+                  </a:solidFill>
+                </a:rPr>
+                <a:t>Client Side Web</a:t>
+              </a:r>
+            </a:p>
+            <a:p>
+              <a:pPr lvl="0" algn="ctr">
+                <a:defRPr/>
+              </a:pPr>
+              <a:r>
+                <a:rPr lang="pt-BR" sz="1600" dirty="0">
+                  <a:solidFill>
+                    <a:prstClr val="white"/>
+                  </a:solidFill>
+                </a:rPr>
+                <a:t>[ Container: Javascript + React + Bootstrap + HTML + Css ]</a:t>
+              </a:r>
+              <a:endParaRPr lang="pt-BR" sz="1200" dirty="0">
+                <a:solidFill>
+                  <a:prstClr val="white"/>
+                </a:solidFill>
+              </a:endParaRPr>
+            </a:p>
+            <a:p>
+              <a:pPr lvl="0" algn="ctr">
+                <a:defRPr/>
+              </a:pPr>
+              <a:r>
+                <a:rPr lang="pt-BR" sz="2000" dirty="0">
+                  <a:solidFill>
+                    <a:prstClr val="white"/>
+                  </a:solidFill>
+                </a:rPr>
+                <a:t>Web system </a:t>
+              </a:r>
+            </a:p>
+            <a:p>
+              <a:pPr lvl="0" algn="ctr">
+                <a:defRPr/>
+              </a:pPr>
+              <a:endParaRPr lang="pt-BR" sz="1600" dirty="0">
+                <a:solidFill>
+                  <a:prstClr val="white"/>
+                </a:solidFill>
+              </a:endParaRPr>
+            </a:p>
+          </p:txBody>
+        </p:sp>
+      </p:grpSp>
+      <p:grpSp>
+        <p:nvGrpSpPr>
+          <p:cNvPr id="83" name="Agrupar 82">
+            <a:extLst>
+              <a:ext uri="{FF2B5EF4-FFF2-40B4-BE49-F238E27FC236}">
+                <a16:creationId xmlns:a16="http://schemas.microsoft.com/office/drawing/2014/main" id="{087D0A49-D608-4F85-A875-6C897D3E0FA6}"/>
+              </a:ext>
+            </a:extLst>
+          </p:cNvPr>
+          <p:cNvGrpSpPr/>
+          <p:nvPr/>
+        </p:nvGrpSpPr>
+        <p:grpSpPr>
+          <a:xfrm>
+            <a:off x="2550212" y="631551"/>
+            <a:ext cx="2616614" cy="2016224"/>
+            <a:chOff x="3117096" y="1908423"/>
+            <a:chExt cx="2616614" cy="2016224"/>
+          </a:xfrm>
+          <a:effectLst>
+            <a:outerShdw blurRad="50800" dist="38100" dir="2700000" algn="tl" rotWithShape="0">
+              <a:prstClr val="black">
+                <a:alpha val="40000"/>
+              </a:prstClr>
+            </a:outerShdw>
+          </a:effectLst>
+        </p:grpSpPr>
+        <p:sp>
+          <p:nvSpPr>
+            <p:cNvPr id="84" name="Fluxograma: Disco Magnético 83">
+              <a:extLst>
+                <a:ext uri="{FF2B5EF4-FFF2-40B4-BE49-F238E27FC236}">
+                  <a16:creationId xmlns:a16="http://schemas.microsoft.com/office/drawing/2014/main" id="{3603F169-43F3-4154-BD0B-2093A4E93188}"/>
+                </a:ext>
+              </a:extLst>
+            </p:cNvPr>
+            <p:cNvSpPr/>
+            <p:nvPr/>
+          </p:nvSpPr>
+          <p:spPr>
+            <a:xfrm>
+              <a:off x="3265091" y="1908423"/>
+              <a:ext cx="2350434" cy="2016224"/>
+            </a:xfrm>
+            <a:prstGeom prst="flowChartMagneticDisk">
+              <a:avLst/>
+            </a:prstGeom>
+            <a:solidFill>
+              <a:schemeClr val="bg1">
+                <a:lumMod val="50000"/>
+              </a:schemeClr>
+            </a:solidFill>
+            <a:ln>
+              <a:solidFill>
+                <a:srgbClr val="253746"/>
+              </a:solidFill>
+            </a:ln>
+          </p:spPr>
+          <p:style>
+            <a:lnRef idx="2">
+              <a:schemeClr val="accent1">
+                <a:shade val="50000"/>
+              </a:schemeClr>
+            </a:lnRef>
+            <a:fillRef idx="1">
+              <a:schemeClr val="accent1"/>
+            </a:fillRef>
+            <a:effectRef idx="0">
+              <a:schemeClr val="accent1"/>
+            </a:effectRef>
+            <a:fontRef idx="minor">
+              <a:schemeClr val="lt1"/>
+            </a:fontRef>
+          </p:style>
+          <p:txBody>
+            <a:bodyPr rtlCol="0" anchor="ctr"/>
+            <a:lstStyle/>
+            <a:p>
+              <a:pPr algn="ctr"/>
+              <a:endParaRPr lang="pt-BR" sz="1800" dirty="0">
+                <a:solidFill>
+                  <a:prstClr val="white"/>
+                </a:solidFill>
+                <a:latin typeface="Calibri"/>
+              </a:endParaRPr>
+            </a:p>
+          </p:txBody>
+        </p:sp>
+        <p:sp>
+          <p:nvSpPr>
+            <p:cNvPr id="85" name="Retângulo 20">
+              <a:extLst>
+                <a:ext uri="{FF2B5EF4-FFF2-40B4-BE49-F238E27FC236}">
+                  <a16:creationId xmlns:a16="http://schemas.microsoft.com/office/drawing/2014/main" id="{2EDEA5D3-7A3C-485A-A22C-0BA59B14CF74}"/>
+                </a:ext>
+              </a:extLst>
+            </p:cNvPr>
+            <p:cNvSpPr/>
+            <p:nvPr/>
+          </p:nvSpPr>
+          <p:spPr>
+            <a:xfrm>
+              <a:off x="3117096" y="2484487"/>
+              <a:ext cx="2566458" cy="646331"/>
+            </a:xfrm>
+            <a:prstGeom prst="rect">
+              <a:avLst/>
+            </a:prstGeom>
+          </p:spPr>
+          <p:txBody>
+            <a:bodyPr wrap="square">
+              <a:spAutoFit/>
+            </a:bodyPr>
+            <a:lstStyle/>
+            <a:p>
+              <a:pPr lvl="0" algn="ctr">
+                <a:defRPr/>
+              </a:pPr>
+              <a:r>
+                <a:rPr lang="pt-BR" sz="2000" b="1" dirty="0">
+                  <a:solidFill>
+                    <a:prstClr val="white"/>
+                  </a:solidFill>
+                </a:rPr>
+                <a:t>Database</a:t>
+              </a:r>
+            </a:p>
+            <a:p>
+              <a:pPr lvl="0" algn="ctr">
+                <a:defRPr/>
+              </a:pPr>
+              <a:r>
+                <a:rPr lang="pt-BR" sz="1600" dirty="0">
+                  <a:solidFill>
+                    <a:prstClr val="white"/>
+                  </a:solidFill>
+                </a:rPr>
+                <a:t>[Container: SQL Server]</a:t>
+              </a:r>
+            </a:p>
+          </p:txBody>
+        </p:sp>
+        <p:sp>
+          <p:nvSpPr>
+            <p:cNvPr id="86" name="Retângulo 20">
+              <a:extLst>
+                <a:ext uri="{FF2B5EF4-FFF2-40B4-BE49-F238E27FC236}">
+                  <a16:creationId xmlns:a16="http://schemas.microsoft.com/office/drawing/2014/main" id="{ADB388AD-C026-428A-9652-766B415787C0}"/>
+                </a:ext>
+              </a:extLst>
+            </p:cNvPr>
+            <p:cNvSpPr/>
+            <p:nvPr/>
+          </p:nvSpPr>
+          <p:spPr>
+            <a:xfrm>
+              <a:off x="3167252" y="3204567"/>
+              <a:ext cx="2566458" cy="584775"/>
+            </a:xfrm>
+            <a:prstGeom prst="rect">
+              <a:avLst/>
+            </a:prstGeom>
+          </p:spPr>
+          <p:txBody>
+            <a:bodyPr wrap="square">
+              <a:spAutoFit/>
+            </a:bodyPr>
+            <a:lstStyle/>
+            <a:p>
+              <a:pPr lvl="0" algn="ctr">
+                <a:defRPr/>
+              </a:pPr>
+              <a:r>
+                <a:rPr lang="pt-BR" sz="1600" dirty="0">
+                  <a:solidFill>
+                    <a:prstClr val="white"/>
+                  </a:solidFill>
+                </a:rPr>
+                <a:t>Armazena os dados dos projetos e cadastros.</a:t>
+              </a:r>
+              <a:endParaRPr lang="pt-BR" sz="1200" dirty="0">
+                <a:solidFill>
+                  <a:prstClr val="white"/>
+                </a:solidFill>
+              </a:endParaRPr>
+            </a:p>
+          </p:txBody>
+        </p:sp>
+      </p:grpSp>
+      <p:grpSp>
+        <p:nvGrpSpPr>
+          <p:cNvPr id="87" name="Agrupar 86">
+            <a:extLst>
+              <a:ext uri="{FF2B5EF4-FFF2-40B4-BE49-F238E27FC236}">
+                <a16:creationId xmlns:a16="http://schemas.microsoft.com/office/drawing/2014/main" id="{8EDA9760-A466-499B-B782-E1EA3C9001BD}"/>
+              </a:ext>
+            </a:extLst>
+          </p:cNvPr>
+          <p:cNvGrpSpPr/>
+          <p:nvPr/>
+        </p:nvGrpSpPr>
+        <p:grpSpPr>
+          <a:xfrm>
+            <a:off x="145554" y="2123473"/>
+            <a:ext cx="2135768" cy="1748522"/>
+            <a:chOff x="239729" y="1548384"/>
+            <a:chExt cx="2377291" cy="2016223"/>
+          </a:xfrm>
+          <a:solidFill>
+            <a:schemeClr val="tx2">
+              <a:lumMod val="40000"/>
+              <a:lumOff val="60000"/>
+            </a:schemeClr>
+          </a:solidFill>
+          <a:effectLst>
+            <a:outerShdw blurRad="50800" dist="38100" dir="2700000" algn="tl" rotWithShape="0">
+              <a:prstClr val="black">
+                <a:alpha val="40000"/>
+              </a:prstClr>
+            </a:outerShdw>
+          </a:effectLst>
+        </p:grpSpPr>
+        <p:sp>
+          <p:nvSpPr>
+            <p:cNvPr id="88" name="Retângulo 29">
+              <a:extLst>
+                <a:ext uri="{FF2B5EF4-FFF2-40B4-BE49-F238E27FC236}">
+                  <a16:creationId xmlns:a16="http://schemas.microsoft.com/office/drawing/2014/main" id="{8A55E3B7-51D2-488D-AFBE-4DCC487E39DB}"/>
+                </a:ext>
+              </a:extLst>
+            </p:cNvPr>
+            <p:cNvSpPr/>
+            <p:nvPr/>
+          </p:nvSpPr>
+          <p:spPr>
+            <a:xfrm>
+              <a:off x="239729" y="1548384"/>
               <a:ext cx="2377290" cy="2016223"/>
             </a:xfrm>
             <a:prstGeom prst="rect">
               <a:avLst/>
             </a:prstGeom>
-            <a:solidFill>
-              <a:schemeClr val="bg1">
-                <a:lumMod val="85000"/>
-              </a:schemeClr>
-            </a:solidFill>
+            <a:grpFill/>
             <a:ln>
               <a:solidFill>
                 <a:srgbClr val="253746"/>
@@ -3405,10 +4745,10 @@
         </p:sp>
         <p:sp>
           <p:nvSpPr>
-            <p:cNvPr id="10" name="Retângulo 20">
+            <p:cNvPr id="89" name="Retângulo 20">
               <a:extLst>
                 <a:ext uri="{FF2B5EF4-FFF2-40B4-BE49-F238E27FC236}">
-                  <a16:creationId xmlns:a16="http://schemas.microsoft.com/office/drawing/2014/main" id="{BF354BBF-11BF-40BE-8CAD-6E92078F3401}"/>
+                  <a16:creationId xmlns:a16="http://schemas.microsoft.com/office/drawing/2014/main" id="{7F37E203-AA48-4EE3-A57D-CA0932632463}"/>
                 </a:ext>
               </a:extLst>
             </p:cNvPr>
@@ -3417,12 +4757,13 @@
           </p:nvSpPr>
           <p:spPr>
             <a:xfrm>
-              <a:off x="3735633" y="4796533"/>
-              <a:ext cx="2566458" cy="646331"/>
+              <a:off x="239729" y="1775720"/>
+              <a:ext cx="2377291" cy="1561549"/>
             </a:xfrm>
             <a:prstGeom prst="rect">
               <a:avLst/>
             </a:prstGeom>
+            <a:noFill/>
           </p:spPr>
           <p:txBody>
             <a:bodyPr wrap="square">
@@ -3434,8 +4775,10 @@
                 <a:defRPr/>
               </a:pPr>
               <a:r>
-                <a:rPr lang="pt-BR" sz="2000" b="1" dirty="0"/>
-                <a:t>API EXTERNA</a:t>
+                <a:rPr lang="pt-BR" sz="1800" b="1" dirty="0">
+                  <a:latin typeface="+mj-lt"/>
+                </a:rPr>
+                <a:t>Application</a:t>
               </a:r>
             </a:p>
             <a:p>
@@ -3444,17 +4787,316 @@
               </a:pPr>
               <a:r>
                 <a:rPr lang="pt-BR" sz="1600" dirty="0"/>
-                <a:t>[]</a:t>
+                <a:t>[Container:]</a:t>
               </a:r>
+            </a:p>
+            <a:p>
+              <a:pPr lvl="0" algn="ctr">
+                <a:defRPr/>
+              </a:pPr>
+              <a:endParaRPr lang="pt-BR" sz="1600" dirty="0"/>
+            </a:p>
+            <a:p>
+              <a:pPr algn="ctr">
+                <a:defRPr/>
+              </a:pPr>
+              <a:r>
+                <a:rPr lang="pt-BR" sz="1600" dirty="0"/>
+                <a:t>APIs para .</a:t>
+              </a:r>
+              <a:endParaRPr lang="pt-BR" sz="1200" dirty="0"/>
+            </a:p>
+            <a:p>
+              <a:pPr lvl="0" algn="ctr">
+                <a:defRPr/>
+              </a:pPr>
+              <a:endParaRPr lang="pt-BR" sz="1600" dirty="0"/>
             </a:p>
           </p:txBody>
         </p:sp>
+      </p:grpSp>
+      <p:grpSp>
+        <p:nvGrpSpPr>
+          <p:cNvPr id="92" name="Group 36">
+            <a:extLst>
+              <a:ext uri="{FF2B5EF4-FFF2-40B4-BE49-F238E27FC236}">
+                <a16:creationId xmlns:a16="http://schemas.microsoft.com/office/drawing/2014/main" id="{04B5E8DF-B558-469B-B983-F39346AF5249}"/>
+              </a:ext>
+            </a:extLst>
+          </p:cNvPr>
+          <p:cNvGrpSpPr/>
+          <p:nvPr/>
+        </p:nvGrpSpPr>
+        <p:grpSpPr>
+          <a:xfrm>
+            <a:off x="6266597" y="4646429"/>
+            <a:ext cx="2463284" cy="2016225"/>
+            <a:chOff x="7149337" y="4654462"/>
+            <a:chExt cx="2463284" cy="2016225"/>
+          </a:xfrm>
+          <a:solidFill>
+            <a:srgbClr val="08376B"/>
+          </a:solidFill>
+          <a:effectLst>
+            <a:outerShdw blurRad="50800" dist="38100" dir="2700000" algn="tl" rotWithShape="0">
+              <a:prstClr val="black">
+                <a:alpha val="40000"/>
+              </a:prstClr>
+            </a:outerShdw>
+          </a:effectLst>
+        </p:grpSpPr>
+        <p:grpSp>
+          <p:nvGrpSpPr>
+            <p:cNvPr id="93" name="Group 22">
+              <a:extLst>
+                <a:ext uri="{FF2B5EF4-FFF2-40B4-BE49-F238E27FC236}">
+                  <a16:creationId xmlns:a16="http://schemas.microsoft.com/office/drawing/2014/main" id="{0B1D3672-7502-414B-8991-C699FE6493A5}"/>
+                </a:ext>
+              </a:extLst>
+            </p:cNvPr>
+            <p:cNvGrpSpPr/>
+            <p:nvPr/>
+          </p:nvGrpSpPr>
+          <p:grpSpPr>
+            <a:xfrm>
+              <a:off x="7149337" y="4654462"/>
+              <a:ext cx="2463283" cy="2016225"/>
+              <a:chOff x="8392958" y="3891083"/>
+              <a:chExt cx="3276202" cy="2212133"/>
+            </a:xfrm>
+            <a:grpFill/>
+          </p:grpSpPr>
+          <p:sp>
+            <p:nvSpPr>
+              <p:cNvPr id="96" name="Retângulo 6">
+                <a:extLst>
+                  <a:ext uri="{FF2B5EF4-FFF2-40B4-BE49-F238E27FC236}">
+                    <a16:creationId xmlns:a16="http://schemas.microsoft.com/office/drawing/2014/main" id="{4993D04E-A6B8-42CE-BEF3-A75ACB7A3BFC}"/>
+                  </a:ext>
+                </a:extLst>
+              </p:cNvPr>
+              <p:cNvSpPr/>
+              <p:nvPr/>
+            </p:nvSpPr>
+            <p:spPr>
+              <a:xfrm>
+                <a:off x="8392958" y="3891083"/>
+                <a:ext cx="3276202" cy="2212133"/>
+              </a:xfrm>
+              <a:prstGeom prst="rect">
+                <a:avLst/>
+              </a:prstGeom>
+              <a:grpFill/>
+              <a:ln>
+                <a:solidFill>
+                  <a:schemeClr val="accent5">
+                    <a:lumMod val="75000"/>
+                  </a:schemeClr>
+                </a:solidFill>
+              </a:ln>
+            </p:spPr>
+            <p:style>
+              <a:lnRef idx="2">
+                <a:schemeClr val="accent1">
+                  <a:shade val="50000"/>
+                </a:schemeClr>
+              </a:lnRef>
+              <a:fillRef idx="1">
+                <a:schemeClr val="accent1"/>
+              </a:fillRef>
+              <a:effectRef idx="0">
+                <a:schemeClr val="accent1"/>
+              </a:effectRef>
+              <a:fontRef idx="minor">
+                <a:schemeClr val="lt1"/>
+              </a:fontRef>
+            </p:style>
+            <p:txBody>
+              <a:bodyPr rtlCol="0" anchor="ctr"/>
+              <a:lstStyle/>
+              <a:p>
+                <a:pPr algn="ctr"/>
+                <a:endParaRPr lang="pt-BR" dirty="0">
+                  <a:solidFill>
+                    <a:prstClr val="white"/>
+                  </a:solidFill>
+                  <a:latin typeface="Calibri"/>
+                </a:endParaRPr>
+              </a:p>
+            </p:txBody>
+          </p:sp>
+          <p:sp>
+            <p:nvSpPr>
+              <p:cNvPr id="97" name="Retângulo 6">
+                <a:extLst>
+                  <a:ext uri="{FF2B5EF4-FFF2-40B4-BE49-F238E27FC236}">
+                    <a16:creationId xmlns:a16="http://schemas.microsoft.com/office/drawing/2014/main" id="{090ADC75-AB71-4615-B5CF-393B56D759A6}"/>
+                  </a:ext>
+                </a:extLst>
+              </p:cNvPr>
+              <p:cNvSpPr/>
+              <p:nvPr/>
+            </p:nvSpPr>
+            <p:spPr>
+              <a:xfrm>
+                <a:off x="8464949" y="3959113"/>
+                <a:ext cx="2577005" cy="226901"/>
+              </a:xfrm>
+              <a:prstGeom prst="rect">
+                <a:avLst/>
+              </a:prstGeom>
+              <a:grpFill/>
+              <a:ln>
+                <a:solidFill>
+                  <a:schemeClr val="bg1"/>
+                </a:solidFill>
+              </a:ln>
+            </p:spPr>
+            <p:style>
+              <a:lnRef idx="2">
+                <a:schemeClr val="accent1">
+                  <a:shade val="50000"/>
+                </a:schemeClr>
+              </a:lnRef>
+              <a:fillRef idx="1">
+                <a:schemeClr val="accent1"/>
+              </a:fillRef>
+              <a:effectRef idx="0">
+                <a:schemeClr val="accent1"/>
+              </a:effectRef>
+              <a:fontRef idx="minor">
+                <a:schemeClr val="lt1"/>
+              </a:fontRef>
+            </p:style>
+            <p:txBody>
+              <a:bodyPr rtlCol="0" anchor="ctr"/>
+              <a:lstStyle/>
+              <a:p>
+                <a:pPr algn="ctr"/>
+                <a:endParaRPr lang="pt-BR" dirty="0">
+                  <a:solidFill>
+                    <a:prstClr val="white"/>
+                  </a:solidFill>
+                  <a:latin typeface="Calibri"/>
+                </a:endParaRPr>
+              </a:p>
+            </p:txBody>
+          </p:sp>
+          <p:sp>
+            <p:nvSpPr>
+              <p:cNvPr id="98" name="Multiply 18">
+                <a:extLst>
+                  <a:ext uri="{FF2B5EF4-FFF2-40B4-BE49-F238E27FC236}">
+                    <a16:creationId xmlns:a16="http://schemas.microsoft.com/office/drawing/2014/main" id="{8FC43FFD-AF1D-4E9A-A0F2-379A3AE13F7A}"/>
+                  </a:ext>
+                </a:extLst>
+              </p:cNvPr>
+              <p:cNvSpPr/>
+              <p:nvPr/>
+            </p:nvSpPr>
+            <p:spPr>
+              <a:xfrm>
+                <a:off x="11309204" y="3924647"/>
+                <a:ext cx="288032" cy="295831"/>
+              </a:xfrm>
+              <a:prstGeom prst="mathMultiply">
+                <a:avLst/>
+              </a:prstGeom>
+              <a:grpFill/>
+              <a:ln>
+                <a:solidFill>
+                  <a:schemeClr val="bg1"/>
+                </a:solidFill>
+              </a:ln>
+            </p:spPr>
+            <p:style>
+              <a:lnRef idx="2">
+                <a:schemeClr val="accent1">
+                  <a:shade val="50000"/>
+                </a:schemeClr>
+              </a:lnRef>
+              <a:fillRef idx="1">
+                <a:schemeClr val="accent1"/>
+              </a:fillRef>
+              <a:effectRef idx="0">
+                <a:schemeClr val="accent1"/>
+              </a:effectRef>
+              <a:fontRef idx="minor">
+                <a:schemeClr val="lt1"/>
+              </a:fontRef>
+            </p:style>
+            <p:txBody>
+              <a:bodyPr rtlCol="0" anchor="ctr"/>
+              <a:lstStyle/>
+              <a:p>
+                <a:pPr algn="ctr"/>
+                <a:endParaRPr lang="pt-BR"/>
+              </a:p>
+            </p:txBody>
+          </p:sp>
+          <p:sp>
+            <p:nvSpPr>
+              <p:cNvPr id="99" name="Circular Arrow 19">
+                <a:extLst>
+                  <a:ext uri="{FF2B5EF4-FFF2-40B4-BE49-F238E27FC236}">
+                    <a16:creationId xmlns:a16="http://schemas.microsoft.com/office/drawing/2014/main" id="{5BDBBCAF-E972-454B-AD41-388CA2CCA11B}"/>
+                  </a:ext>
+                </a:extLst>
+              </p:cNvPr>
+              <p:cNvSpPr/>
+              <p:nvPr/>
+            </p:nvSpPr>
+            <p:spPr>
+              <a:xfrm rot="16500000">
+                <a:off x="11158829" y="3927941"/>
+                <a:ext cx="216000" cy="288000"/>
+              </a:xfrm>
+              <a:prstGeom prst="circularArrow">
+                <a:avLst/>
+              </a:prstGeom>
+              <a:grpFill/>
+              <a:ln>
+                <a:solidFill>
+                  <a:schemeClr val="bg1"/>
+                </a:solidFill>
+              </a:ln>
+            </p:spPr>
+            <p:style>
+              <a:lnRef idx="2">
+                <a:schemeClr val="accent1">
+                  <a:shade val="50000"/>
+                </a:schemeClr>
+              </a:lnRef>
+              <a:fillRef idx="1">
+                <a:schemeClr val="accent1"/>
+              </a:fillRef>
+              <a:effectRef idx="0">
+                <a:schemeClr val="accent1"/>
+              </a:effectRef>
+              <a:fontRef idx="minor">
+                <a:schemeClr val="lt1"/>
+              </a:fontRef>
+            </p:style>
+            <p:txBody>
+              <a:bodyPr rtlCol="0" anchor="ctr"/>
+              <a:lstStyle/>
+              <a:p>
+                <a:pPr algn="ctr"/>
+                <a:endParaRPr lang="pt-BR">
+                  <a:solidFill>
+                    <a:schemeClr val="tx1"/>
+                  </a:solidFill>
+                </a:endParaRPr>
+              </a:p>
+            </p:txBody>
+          </p:sp>
+        </p:grpSp>
         <p:sp>
           <p:nvSpPr>
-            <p:cNvPr id="11" name="Retângulo 20">
+            <p:cNvPr id="94" name="Retângulo 20">
               <a:extLst>
                 <a:ext uri="{FF2B5EF4-FFF2-40B4-BE49-F238E27FC236}">
-                  <a16:creationId xmlns:a16="http://schemas.microsoft.com/office/drawing/2014/main" id="{5F8BDF1C-3C9F-4E3C-9184-8C3E3C64FB78}"/>
+                  <a16:creationId xmlns:a16="http://schemas.microsoft.com/office/drawing/2014/main" id="{989E3DC1-95F7-4C4F-883D-9E5ECE7D476A}"/>
                 </a:ext>
               </a:extLst>
             </p:cNvPr>
@@ -3463,12 +5105,13 @@
           </p:nvSpPr>
           <p:spPr>
             <a:xfrm>
-              <a:off x="157848" y="2542903"/>
-              <a:ext cx="2566458" cy="276999"/>
+              <a:off x="7149337" y="4933541"/>
+              <a:ext cx="2463284" cy="1631216"/>
             </a:xfrm>
             <a:prstGeom prst="rect">
               <a:avLst/>
             </a:prstGeom>
+            <a:noFill/>
           </p:spPr>
           <p:txBody>
             <a:bodyPr wrap="square">
@@ -3479,315 +5122,63 @@
               <a:pPr lvl="0" algn="ctr">
                 <a:defRPr/>
               </a:pPr>
-              <a:endParaRPr lang="pt-BR" sz="1200" dirty="0"/>
+              <a:r>
+                <a:rPr lang="pt-BR" sz="2000" b="1" dirty="0">
+                  <a:solidFill>
+                    <a:prstClr val="white"/>
+                  </a:solidFill>
+                </a:rPr>
+                <a:t>Client Side Web</a:t>
+              </a:r>
+            </a:p>
+            <a:p>
+              <a:pPr lvl="0" algn="ctr">
+                <a:defRPr/>
+              </a:pPr>
+              <a:r>
+                <a:rPr lang="pt-BR" sz="1600" dirty="0">
+                  <a:solidFill>
+                    <a:prstClr val="white"/>
+                  </a:solidFill>
+                </a:rPr>
+                <a:t>[Container: Javascript + React + Bootstrap + HTML + Css ]</a:t>
+              </a:r>
+            </a:p>
+            <a:p>
+              <a:pPr lvl="0" algn="ctr">
+                <a:defRPr/>
+              </a:pPr>
+              <a:r>
+                <a:rPr lang="pt-BR" sz="1600" dirty="0">
+                  <a:solidFill>
+                    <a:prstClr val="white"/>
+                  </a:solidFill>
+                </a:rPr>
+                <a:t>Plataforma para protopersonas</a:t>
+              </a:r>
             </a:p>
           </p:txBody>
         </p:sp>
       </p:grpSp>
-      <p:sp>
-        <p:nvSpPr>
-          <p:cNvPr id="16" name="Fluxograma: Disco Magnético 15">
-            <a:extLst>
-              <a:ext uri="{FF2B5EF4-FFF2-40B4-BE49-F238E27FC236}">
-                <a16:creationId xmlns:a16="http://schemas.microsoft.com/office/drawing/2014/main" id="{186B7369-D016-49F6-8672-91EEACB1ABBF}"/>
-              </a:ext>
-            </a:extLst>
-          </p:cNvPr>
-          <p:cNvSpPr/>
-          <p:nvPr/>
-        </p:nvSpPr>
-        <p:spPr>
-          <a:xfrm>
-            <a:off x="3881644" y="701096"/>
-            <a:ext cx="2350434" cy="2016224"/>
-          </a:xfrm>
-          <a:prstGeom prst="flowChartMagneticDisk">
-            <a:avLst/>
-          </a:prstGeom>
-          <a:solidFill>
-            <a:schemeClr val="bg1">
-              <a:lumMod val="50000"/>
-            </a:schemeClr>
-          </a:solidFill>
-          <a:ln>
-            <a:solidFill>
-              <a:srgbClr val="253746"/>
-            </a:solidFill>
-          </a:ln>
-        </p:spPr>
-        <p:style>
-          <a:lnRef idx="2">
-            <a:schemeClr val="accent1">
-              <a:shade val="50000"/>
-            </a:schemeClr>
-          </a:lnRef>
-          <a:fillRef idx="1">
-            <a:schemeClr val="accent1"/>
-          </a:fillRef>
-          <a:effectRef idx="0">
-            <a:schemeClr val="accent1"/>
-          </a:effectRef>
-          <a:fontRef idx="minor">
-            <a:schemeClr val="lt1"/>
-          </a:fontRef>
-        </p:style>
-        <p:txBody>
-          <a:bodyPr rtlCol="0" anchor="ctr"/>
-          <a:lstStyle/>
-          <a:p>
-            <a:pPr lvl="0" algn="ctr">
-              <a:defRPr/>
-            </a:pPr>
-            <a:r>
-              <a:rPr lang="pt-BR" sz="2400" b="1" dirty="0" err="1">
-                <a:solidFill>
-                  <a:prstClr val="white"/>
-                </a:solidFill>
-              </a:rPr>
-              <a:t>Database</a:t>
-            </a:r>
-            <a:endParaRPr lang="pt-BR" sz="2400" b="1" dirty="0">
-              <a:solidFill>
-                <a:prstClr val="white"/>
-              </a:solidFill>
-            </a:endParaRPr>
-          </a:p>
-          <a:p>
-            <a:pPr lvl="0" algn="ctr">
-              <a:defRPr/>
-            </a:pPr>
-            <a:r>
-              <a:rPr lang="pt-BR" dirty="0">
-                <a:solidFill>
-                  <a:prstClr val="white"/>
-                </a:solidFill>
-              </a:rPr>
-              <a:t>[Container: SQL Server]</a:t>
-            </a:r>
-          </a:p>
-          <a:p>
-            <a:pPr lvl="0" algn="ctr">
-              <a:defRPr/>
-            </a:pPr>
-            <a:endParaRPr lang="pt-BR" dirty="0">
-              <a:solidFill>
-                <a:prstClr val="white"/>
-              </a:solidFill>
-            </a:endParaRPr>
-          </a:p>
-          <a:p>
-            <a:pPr lvl="0" algn="ctr">
-              <a:defRPr/>
-            </a:pPr>
-            <a:r>
-              <a:rPr lang="pt-BR" dirty="0">
-                <a:solidFill>
-                  <a:prstClr val="white"/>
-                </a:solidFill>
-              </a:rPr>
-              <a:t>Armazenamento de dados</a:t>
-            </a:r>
-          </a:p>
-        </p:txBody>
-      </p:sp>
-      <p:sp>
-        <p:nvSpPr>
-          <p:cNvPr id="24" name="CaixaDeTexto 23">
-            <a:extLst>
-              <a:ext uri="{FF2B5EF4-FFF2-40B4-BE49-F238E27FC236}">
-                <a16:creationId xmlns:a16="http://schemas.microsoft.com/office/drawing/2014/main" id="{E26306CE-13ED-4D6B-A104-AA3A8293697E}"/>
-              </a:ext>
-            </a:extLst>
-          </p:cNvPr>
-          <p:cNvSpPr txBox="1"/>
-          <p:nvPr/>
-        </p:nvSpPr>
-        <p:spPr>
-          <a:xfrm>
-            <a:off x="3047301" y="3061765"/>
-            <a:ext cx="6094602" cy="369332"/>
-          </a:xfrm>
-          <a:prstGeom prst="rect">
-            <a:avLst/>
-          </a:prstGeom>
-          <a:noFill/>
-        </p:spPr>
-        <p:txBody>
-          <a:bodyPr wrap="square">
-            <a:spAutoFit/>
-          </a:bodyPr>
-          <a:lstStyle/>
-          <a:p>
-            <a:pPr lvl="0" algn="ctr">
-              <a:defRPr/>
-            </a:pPr>
-            <a:r>
-              <a:rPr lang="pt-BR" sz="1800" dirty="0">
-                <a:solidFill>
-                  <a:prstClr val="white"/>
-                </a:solidFill>
-              </a:rPr>
-              <a:t>[Container: SQL Server]</a:t>
-            </a:r>
-          </a:p>
-        </p:txBody>
-      </p:sp>
-      <p:sp>
-        <p:nvSpPr>
-          <p:cNvPr id="25" name="Retângulo 24">
-            <a:extLst>
-              <a:ext uri="{FF2B5EF4-FFF2-40B4-BE49-F238E27FC236}">
-                <a16:creationId xmlns:a16="http://schemas.microsoft.com/office/drawing/2014/main" id="{22A7FDF9-0206-49A4-8D91-7D0C158F152A}"/>
-              </a:ext>
-            </a:extLst>
-          </p:cNvPr>
-          <p:cNvSpPr/>
-          <p:nvPr/>
-        </p:nvSpPr>
-        <p:spPr>
-          <a:xfrm>
-            <a:off x="7779740" y="979890"/>
-            <a:ext cx="2376264" cy="2016224"/>
-          </a:xfrm>
-          <a:prstGeom prst="rect">
-            <a:avLst/>
-          </a:prstGeom>
-          <a:ln/>
-        </p:spPr>
-        <p:style>
-          <a:lnRef idx="2">
-            <a:schemeClr val="accent5">
-              <a:shade val="50000"/>
-            </a:schemeClr>
-          </a:lnRef>
-          <a:fillRef idx="1">
-            <a:schemeClr val="accent5"/>
-          </a:fillRef>
-          <a:effectRef idx="0">
-            <a:schemeClr val="accent5"/>
-          </a:effectRef>
-          <a:fontRef idx="minor">
-            <a:schemeClr val="lt1"/>
-          </a:fontRef>
-        </p:style>
-        <p:txBody>
-          <a:bodyPr rtlCol="0" anchor="ctr"/>
-          <a:lstStyle/>
-          <a:p>
-            <a:pPr lvl="0" algn="ctr">
-              <a:defRPr/>
-            </a:pPr>
-            <a:r>
-              <a:rPr lang="pt-BR" sz="2400" b="1" dirty="0">
-                <a:solidFill>
-                  <a:prstClr val="white"/>
-                </a:solidFill>
-              </a:rPr>
-              <a:t>Web </a:t>
-            </a:r>
-            <a:r>
-              <a:rPr lang="pt-BR" sz="2400" b="1" dirty="0" err="1">
-                <a:solidFill>
-                  <a:prstClr val="white"/>
-                </a:solidFill>
-              </a:rPr>
-              <a:t>Application</a:t>
-            </a:r>
-            <a:r>
-              <a:rPr lang="pt-BR" sz="2400" b="1" dirty="0">
-                <a:solidFill>
-                  <a:prstClr val="white"/>
-                </a:solidFill>
-              </a:rPr>
-              <a:t> </a:t>
-            </a:r>
-          </a:p>
-          <a:p>
-            <a:pPr lvl="0" algn="ctr">
-              <a:defRPr/>
-            </a:pPr>
-            <a:r>
-              <a:rPr lang="pt-BR" sz="1800" dirty="0">
-                <a:solidFill>
-                  <a:prstClr val="white"/>
-                </a:solidFill>
-              </a:rPr>
-              <a:t>[Container: Spring login e </a:t>
-            </a:r>
-            <a:r>
-              <a:rPr lang="pt-BR" sz="1800" dirty="0" err="1">
-                <a:solidFill>
-                  <a:prstClr val="white"/>
-                </a:solidFill>
-              </a:rPr>
-              <a:t>logoff</a:t>
-            </a:r>
-            <a:endParaRPr lang="pt-BR" sz="1800" dirty="0">
-              <a:solidFill>
-                <a:prstClr val="white"/>
-              </a:solidFill>
-            </a:endParaRPr>
-          </a:p>
-          <a:p>
-            <a:pPr lvl="0" algn="ctr">
-              <a:defRPr/>
-            </a:pPr>
-            <a:endParaRPr lang="pt-BR" dirty="0">
-              <a:solidFill>
-                <a:prstClr val="white"/>
-              </a:solidFill>
-              <a:latin typeface="Calibri"/>
-            </a:endParaRPr>
-          </a:p>
-          <a:p>
-            <a:pPr lvl="0" algn="ctr">
-              <a:defRPr/>
-            </a:pPr>
-            <a:r>
-              <a:rPr lang="pt-BR" sz="1800" dirty="0">
-                <a:solidFill>
-                  <a:prstClr val="white"/>
-                </a:solidFill>
-                <a:latin typeface="Calibri"/>
-              </a:rPr>
-              <a:t>Acesso ao sistema e </a:t>
-            </a:r>
-            <a:r>
-              <a:rPr lang="pt-BR" sz="1800" dirty="0" err="1">
-                <a:solidFill>
-                  <a:prstClr val="white"/>
-                </a:solidFill>
-                <a:latin typeface="Calibri"/>
-              </a:rPr>
-              <a:t>crud</a:t>
-            </a:r>
-            <a:endParaRPr lang="pt-BR" sz="1800" dirty="0">
-              <a:solidFill>
-                <a:prstClr val="white"/>
-              </a:solidFill>
-              <a:latin typeface="Calibri"/>
-            </a:endParaRPr>
-          </a:p>
-        </p:txBody>
-      </p:sp>
       <p:cxnSp>
         <p:nvCxnSpPr>
-          <p:cNvPr id="28" name="Conector de Seta Reta 27">
-            <a:extLst>
-              <a:ext uri="{FF2B5EF4-FFF2-40B4-BE49-F238E27FC236}">
-                <a16:creationId xmlns:a16="http://schemas.microsoft.com/office/drawing/2014/main" id="{5AC19C29-B763-4897-B60C-3C7222F149B7}"/>
+          <p:cNvPr id="101" name="Conector de Seta Reta 100">
+            <a:extLst>
+              <a:ext uri="{FF2B5EF4-FFF2-40B4-BE49-F238E27FC236}">
+                <a16:creationId xmlns:a16="http://schemas.microsoft.com/office/drawing/2014/main" id="{3925AEB4-E63A-48D5-BD52-0658A5997F0C}"/>
               </a:ext>
             </a:extLst>
           </p:cNvPr>
           <p:cNvCxnSpPr>
             <a:cxnSpLocks/>
+            <a:stCxn id="96" idx="1"/>
           </p:cNvCxnSpPr>
           <p:nvPr/>
         </p:nvCxnSpPr>
         <p:spPr>
-          <a:xfrm flipH="1">
-            <a:off x="6232078" y="1829839"/>
-            <a:ext cx="1547663" cy="0"/>
+          <a:xfrm flipH="1" flipV="1">
+            <a:off x="5082067" y="1860686"/>
+            <a:ext cx="1184530" cy="3793856"/>
           </a:xfrm>
           <a:prstGeom prst="straightConnector1">
             <a:avLst/>
@@ -3802,6 +5193,13 @@
             <a:headEnd type="none" w="lg" len="lg"/>
             <a:tailEnd type="triangle" w="lg" len="lg"/>
           </a:ln>
+          <a:effectLst>
+            <a:outerShdw blurRad="50800" dist="38100" dir="2700000" algn="tl" rotWithShape="0">
+              <a:prstClr val="black">
+                <a:alpha val="40000"/>
+              </a:prstClr>
+            </a:outerShdw>
+          </a:effectLst>
         </p:spPr>
         <p:style>
           <a:lnRef idx="1">
@@ -3818,12 +5216,370 @@
           </a:fontRef>
         </p:style>
       </p:cxnSp>
-      <p:sp>
-        <p:nvSpPr>
-          <p:cNvPr id="30" name="Retângulo 6">
-            <a:extLst>
-              <a:ext uri="{FF2B5EF4-FFF2-40B4-BE49-F238E27FC236}">
-                <a16:creationId xmlns:a16="http://schemas.microsoft.com/office/drawing/2014/main" id="{BDFD5E47-599C-465B-951E-494A69D4EBB1}"/>
+      <p:grpSp>
+        <p:nvGrpSpPr>
+          <p:cNvPr id="102" name="Agrupar 101">
+            <a:extLst>
+              <a:ext uri="{FF2B5EF4-FFF2-40B4-BE49-F238E27FC236}">
+                <a16:creationId xmlns:a16="http://schemas.microsoft.com/office/drawing/2014/main" id="{44A3E7DE-7B90-4CAB-8BE4-32091C79E099}"/>
+              </a:ext>
+            </a:extLst>
+          </p:cNvPr>
+          <p:cNvGrpSpPr/>
+          <p:nvPr/>
+        </p:nvGrpSpPr>
+        <p:grpSpPr>
+          <a:xfrm>
+            <a:off x="9403700" y="4646431"/>
+            <a:ext cx="2377290" cy="2016223"/>
+            <a:chOff x="239729" y="1548384"/>
+            <a:chExt cx="2377290" cy="2016223"/>
+          </a:xfrm>
+          <a:solidFill>
+            <a:schemeClr val="tx2">
+              <a:lumMod val="40000"/>
+              <a:lumOff val="60000"/>
+            </a:schemeClr>
+          </a:solidFill>
+          <a:effectLst>
+            <a:outerShdw blurRad="50800" dist="38100" dir="2700000" algn="tl" rotWithShape="0">
+              <a:prstClr val="black">
+                <a:alpha val="40000"/>
+              </a:prstClr>
+            </a:outerShdw>
+          </a:effectLst>
+        </p:grpSpPr>
+        <p:sp>
+          <p:nvSpPr>
+            <p:cNvPr id="103" name="Retângulo 29">
+              <a:extLst>
+                <a:ext uri="{FF2B5EF4-FFF2-40B4-BE49-F238E27FC236}">
+                  <a16:creationId xmlns:a16="http://schemas.microsoft.com/office/drawing/2014/main" id="{86F51D9E-B5B6-4567-AF43-7ADCC98A1F84}"/>
+                </a:ext>
+              </a:extLst>
+            </p:cNvPr>
+            <p:cNvSpPr/>
+            <p:nvPr/>
+          </p:nvSpPr>
+          <p:spPr>
+            <a:xfrm>
+              <a:off x="239729" y="1548384"/>
+              <a:ext cx="2377290" cy="2016223"/>
+            </a:xfrm>
+            <a:prstGeom prst="rect">
+              <a:avLst/>
+            </a:prstGeom>
+            <a:grpFill/>
+            <a:ln>
+              <a:solidFill>
+                <a:srgbClr val="253746"/>
+              </a:solidFill>
+              <a:prstDash val="dash"/>
+            </a:ln>
+          </p:spPr>
+          <p:style>
+            <a:lnRef idx="2">
+              <a:schemeClr val="accent1">
+                <a:shade val="50000"/>
+              </a:schemeClr>
+            </a:lnRef>
+            <a:fillRef idx="1">
+              <a:schemeClr val="accent1"/>
+            </a:fillRef>
+            <a:effectRef idx="0">
+              <a:schemeClr val="accent1"/>
+            </a:effectRef>
+            <a:fontRef idx="minor">
+              <a:schemeClr val="lt1"/>
+            </a:fontRef>
+          </p:style>
+          <p:txBody>
+            <a:bodyPr rtlCol="0" anchor="ctr"/>
+            <a:lstStyle/>
+            <a:p>
+              <a:pPr algn="ctr"/>
+              <a:endParaRPr lang="pt-BR" sz="1800" dirty="0">
+                <a:solidFill>
+                  <a:prstClr val="white"/>
+                </a:solidFill>
+                <a:latin typeface="Calibri"/>
+              </a:endParaRPr>
+            </a:p>
+          </p:txBody>
+        </p:sp>
+        <p:sp>
+          <p:nvSpPr>
+            <p:cNvPr id="104" name="Retângulo 20">
+              <a:extLst>
+                <a:ext uri="{FF2B5EF4-FFF2-40B4-BE49-F238E27FC236}">
+                  <a16:creationId xmlns:a16="http://schemas.microsoft.com/office/drawing/2014/main" id="{312C6F62-2864-4BE1-A548-70E4E399B511}"/>
+                </a:ext>
+              </a:extLst>
+            </p:cNvPr>
+            <p:cNvSpPr/>
+            <p:nvPr/>
+          </p:nvSpPr>
+          <p:spPr>
+            <a:xfrm>
+              <a:off x="267355" y="1720912"/>
+              <a:ext cx="2326602" cy="1600438"/>
+            </a:xfrm>
+            <a:prstGeom prst="rect">
+              <a:avLst/>
+            </a:prstGeom>
+            <a:noFill/>
+          </p:spPr>
+          <p:txBody>
+            <a:bodyPr wrap="square">
+              <a:spAutoFit/>
+            </a:bodyPr>
+            <a:lstStyle/>
+            <a:p>
+              <a:pPr lvl="0" algn="ctr">
+                <a:defRPr/>
+              </a:pPr>
+              <a:r>
+                <a:rPr lang="pt-BR" sz="1800" b="1" dirty="0">
+                  <a:latin typeface="+mj-lt"/>
+                </a:rPr>
+                <a:t>Application</a:t>
+              </a:r>
+            </a:p>
+            <a:p>
+              <a:pPr lvl="0" algn="ctr">
+                <a:defRPr/>
+              </a:pPr>
+              <a:r>
+                <a:rPr lang="pt-BR" sz="1600" dirty="0"/>
+                <a:t>[Container:]</a:t>
+              </a:r>
+            </a:p>
+            <a:p>
+              <a:pPr lvl="0" algn="ctr">
+                <a:defRPr/>
+              </a:pPr>
+              <a:endParaRPr lang="pt-BR" sz="1600" dirty="0"/>
+            </a:p>
+            <a:p>
+              <a:pPr lvl="0" algn="ctr">
+                <a:defRPr/>
+              </a:pPr>
+              <a:endParaRPr lang="pt-BR" sz="1600" dirty="0"/>
+            </a:p>
+            <a:p>
+              <a:pPr algn="ctr">
+                <a:defRPr/>
+              </a:pPr>
+              <a:r>
+                <a:rPr lang="pt-BR" sz="1600" dirty="0"/>
+                <a:t>APIs para .</a:t>
+              </a:r>
+              <a:endParaRPr lang="pt-BR" sz="1200" dirty="0"/>
+            </a:p>
+            <a:p>
+              <a:pPr lvl="0" algn="ctr">
+                <a:defRPr/>
+              </a:pPr>
+              <a:endParaRPr lang="pt-BR" sz="1600" dirty="0"/>
+            </a:p>
+          </p:txBody>
+        </p:sp>
+      </p:grpSp>
+      <p:cxnSp>
+        <p:nvCxnSpPr>
+          <p:cNvPr id="118" name="Conector de Seta Reta 117">
+            <a:extLst>
+              <a:ext uri="{FF2B5EF4-FFF2-40B4-BE49-F238E27FC236}">
+                <a16:creationId xmlns:a16="http://schemas.microsoft.com/office/drawing/2014/main" id="{D0053010-8055-4B8A-8308-AB08E0F6B8EF}"/>
+              </a:ext>
+            </a:extLst>
+          </p:cNvPr>
+          <p:cNvCxnSpPr>
+            <a:cxnSpLocks/>
+            <a:endCxn id="73" idx="1"/>
+          </p:cNvCxnSpPr>
+          <p:nvPr/>
+        </p:nvCxnSpPr>
+        <p:spPr>
+          <a:xfrm flipV="1">
+            <a:off x="883247" y="4740759"/>
+            <a:ext cx="1839223" cy="10994"/>
+          </a:xfrm>
+          <a:prstGeom prst="straightConnector1">
+            <a:avLst/>
+          </a:prstGeom>
+          <a:ln w="19050">
+            <a:solidFill>
+              <a:schemeClr val="accent5">
+                <a:lumMod val="75000"/>
+              </a:schemeClr>
+            </a:solidFill>
+            <a:prstDash val="sysDash"/>
+            <a:headEnd type="none" w="lg" len="lg"/>
+            <a:tailEnd type="triangle" w="lg" len="lg"/>
+          </a:ln>
+          <a:effectLst>
+            <a:outerShdw blurRad="50800" dist="38100" dir="2700000" algn="tl" rotWithShape="0">
+              <a:prstClr val="black">
+                <a:alpha val="40000"/>
+              </a:prstClr>
+            </a:outerShdw>
+          </a:effectLst>
+        </p:spPr>
+        <p:style>
+          <a:lnRef idx="1">
+            <a:schemeClr val="accent1"/>
+          </a:lnRef>
+          <a:fillRef idx="0">
+            <a:schemeClr val="accent1"/>
+          </a:fillRef>
+          <a:effectRef idx="0">
+            <a:schemeClr val="accent1"/>
+          </a:effectRef>
+          <a:fontRef idx="minor">
+            <a:schemeClr val="tx1"/>
+          </a:fontRef>
+        </p:style>
+      </p:cxnSp>
+      <p:cxnSp>
+        <p:nvCxnSpPr>
+          <p:cNvPr id="133" name="Conector de Seta Reta 132">
+            <a:extLst>
+              <a:ext uri="{FF2B5EF4-FFF2-40B4-BE49-F238E27FC236}">
+                <a16:creationId xmlns:a16="http://schemas.microsoft.com/office/drawing/2014/main" id="{E2FB4F0B-D7D6-4FB3-ADE7-D0701080A66B}"/>
+              </a:ext>
+            </a:extLst>
+          </p:cNvPr>
+          <p:cNvCxnSpPr>
+            <a:cxnSpLocks/>
+            <a:stCxn id="103" idx="1"/>
+            <a:endCxn id="96" idx="3"/>
+          </p:cNvCxnSpPr>
+          <p:nvPr/>
+        </p:nvCxnSpPr>
+        <p:spPr>
+          <a:xfrm flipH="1" flipV="1">
+            <a:off x="8729880" y="5654542"/>
+            <a:ext cx="673820" cy="1"/>
+          </a:xfrm>
+          <a:prstGeom prst="straightConnector1">
+            <a:avLst/>
+          </a:prstGeom>
+          <a:ln w="19050">
+            <a:solidFill>
+              <a:schemeClr val="accent5">
+                <a:lumMod val="75000"/>
+              </a:schemeClr>
+            </a:solidFill>
+            <a:prstDash val="sysDash"/>
+            <a:headEnd type="none" w="lg" len="lg"/>
+            <a:tailEnd type="triangle" w="lg" len="lg"/>
+          </a:ln>
+          <a:effectLst>
+            <a:outerShdw blurRad="50800" dist="38100" dir="2700000" algn="tl" rotWithShape="0">
+              <a:prstClr val="black">
+                <a:alpha val="40000"/>
+              </a:prstClr>
+            </a:outerShdw>
+          </a:effectLst>
+        </p:spPr>
+        <p:style>
+          <a:lnRef idx="1">
+            <a:schemeClr val="accent1"/>
+          </a:lnRef>
+          <a:fillRef idx="0">
+            <a:schemeClr val="accent1"/>
+          </a:fillRef>
+          <a:effectRef idx="0">
+            <a:schemeClr val="accent1"/>
+          </a:effectRef>
+          <a:fontRef idx="minor">
+            <a:schemeClr val="tx1"/>
+          </a:fontRef>
+        </p:style>
+      </p:cxnSp>
+      <p:pic>
+        <p:nvPicPr>
+          <p:cNvPr id="138" name="Imagem 137" descr="Desenho de cachorro&#10;&#10;Descrição gerada automaticamente">
+            <a:extLst>
+              <a:ext uri="{FF2B5EF4-FFF2-40B4-BE49-F238E27FC236}">
+                <a16:creationId xmlns:a16="http://schemas.microsoft.com/office/drawing/2014/main" id="{4383D014-822E-481E-8394-A09FB7931440}"/>
+              </a:ext>
+            </a:extLst>
+          </p:cNvPr>
+          <p:cNvPicPr>
+            <a:picLocks noChangeAspect="1"/>
+          </p:cNvPicPr>
+          <p:nvPr/>
+        </p:nvPicPr>
+        <p:blipFill>
+          <a:blip r:embed="rId3">
+            <a:extLst>
+              <a:ext uri="{28A0092B-C50C-407E-A947-70E740481C1C}">
+                <a14:useLocalDpi xmlns:a14="http://schemas.microsoft.com/office/drawing/2010/main" val="0"/>
+              </a:ext>
+            </a:extLst>
+          </a:blip>
+          <a:stretch>
+            <a:fillRect/>
+          </a:stretch>
+        </p:blipFill>
+        <p:spPr>
+          <a:xfrm>
+            <a:off x="61345" y="6284333"/>
+            <a:ext cx="2643366" cy="531317"/>
+          </a:xfrm>
+          <a:prstGeom prst="rect">
+            <a:avLst/>
+          </a:prstGeom>
+        </p:spPr>
+      </p:pic>
+      <p:sp>
+        <p:nvSpPr>
+          <p:cNvPr id="140" name="CaixaDeTexto 139">
+            <a:extLst>
+              <a:ext uri="{FF2B5EF4-FFF2-40B4-BE49-F238E27FC236}">
+                <a16:creationId xmlns:a16="http://schemas.microsoft.com/office/drawing/2014/main" id="{675DBF3B-EF05-4F3A-97EF-FB6659F0D32E}"/>
+              </a:ext>
+            </a:extLst>
+          </p:cNvPr>
+          <p:cNvSpPr txBox="1"/>
+          <p:nvPr/>
+        </p:nvSpPr>
+        <p:spPr>
+          <a:xfrm>
+            <a:off x="5447238" y="195346"/>
+            <a:ext cx="6864219" cy="646331"/>
+          </a:xfrm>
+          <a:prstGeom prst="rect">
+            <a:avLst/>
+          </a:prstGeom>
+          <a:noFill/>
+          <a:effectLst/>
+        </p:spPr>
+        <p:txBody>
+          <a:bodyPr wrap="square">
+            <a:spAutoFit/>
+          </a:bodyPr>
+          <a:lstStyle/>
+          <a:p>
+            <a:r>
+              <a:rPr lang="pt-BR" sz="3600" b="1" dirty="0">
+                <a:solidFill>
+                  <a:srgbClr val="08376B"/>
+                </a:solidFill>
+              </a:rPr>
+              <a:t>Diagrama de Solução de Software</a:t>
+            </a:r>
+          </a:p>
+        </p:txBody>
+      </p:sp>
+      <p:sp>
+        <p:nvSpPr>
+          <p:cNvPr id="174" name="Retângulo 6">
+            <a:extLst>
+              <a:ext uri="{FF2B5EF4-FFF2-40B4-BE49-F238E27FC236}">
+                <a16:creationId xmlns:a16="http://schemas.microsoft.com/office/drawing/2014/main" id="{4984765D-70B4-44BD-BACA-BE9CD3554FEF}"/>
               </a:ext>
             </a:extLst>
           </p:cNvPr>
@@ -3832,7 +5588,7 @@
         </p:nvSpPr>
         <p:spPr>
           <a:xfrm>
-            <a:off x="7736230" y="3846063"/>
+            <a:off x="9672311" y="1398957"/>
             <a:ext cx="2463283" cy="2016225"/>
           </a:xfrm>
           <a:prstGeom prst="rect">
@@ -3996,107 +5752,10 @@
           </a:p>
         </p:txBody>
       </p:sp>
-      <p:cxnSp>
-        <p:nvCxnSpPr>
-          <p:cNvPr id="33" name="Conector de Seta Reta 107">
-            <a:extLst>
-              <a:ext uri="{FF2B5EF4-FFF2-40B4-BE49-F238E27FC236}">
-                <a16:creationId xmlns:a16="http://schemas.microsoft.com/office/drawing/2014/main" id="{44F24B2F-310F-474C-A6B5-1D336CB26EE3}"/>
-              </a:ext>
-            </a:extLst>
-          </p:cNvPr>
-          <p:cNvCxnSpPr>
-            <a:cxnSpLocks/>
-            <a:stCxn id="30" idx="0"/>
-          </p:cNvCxnSpPr>
-          <p:nvPr/>
-        </p:nvCxnSpPr>
-        <p:spPr>
-          <a:xfrm flipV="1">
-            <a:off x="8967872" y="2996115"/>
-            <a:ext cx="0" cy="849948"/>
-          </a:xfrm>
-          <a:prstGeom prst="straightConnector1">
-            <a:avLst/>
-          </a:prstGeom>
-          <a:ln w="19050">
-            <a:solidFill>
-              <a:schemeClr val="accent5">
-                <a:lumMod val="75000"/>
-              </a:schemeClr>
-            </a:solidFill>
-            <a:prstDash val="sysDash"/>
-            <a:headEnd type="none" w="lg" len="lg"/>
-            <a:tailEnd type="triangle" w="lg" len="lg"/>
-          </a:ln>
-        </p:spPr>
-        <p:style>
-          <a:lnRef idx="1">
-            <a:schemeClr val="accent1"/>
-          </a:lnRef>
-          <a:fillRef idx="0">
-            <a:schemeClr val="accent1"/>
-          </a:fillRef>
-          <a:effectRef idx="0">
-            <a:schemeClr val="accent1"/>
-          </a:effectRef>
-          <a:fontRef idx="minor">
-            <a:schemeClr val="tx1"/>
-          </a:fontRef>
-        </p:style>
-      </p:cxnSp>
-      <p:cxnSp>
-        <p:nvCxnSpPr>
-          <p:cNvPr id="35" name="Conector de Seta Reta 107">
-            <a:extLst>
-              <a:ext uri="{FF2B5EF4-FFF2-40B4-BE49-F238E27FC236}">
-                <a16:creationId xmlns:a16="http://schemas.microsoft.com/office/drawing/2014/main" id="{092DA178-4957-422F-A731-3B819FDF1D4A}"/>
-              </a:ext>
-            </a:extLst>
-          </p:cNvPr>
-          <p:cNvCxnSpPr>
-            <a:cxnSpLocks/>
-          </p:cNvCxnSpPr>
-          <p:nvPr/>
-        </p:nvCxnSpPr>
-        <p:spPr>
-          <a:xfrm>
-            <a:off x="6637650" y="4663022"/>
-            <a:ext cx="1098580" cy="1"/>
-          </a:xfrm>
-          <a:prstGeom prst="straightConnector1">
-            <a:avLst/>
-          </a:prstGeom>
-          <a:ln w="19050">
-            <a:solidFill>
-              <a:schemeClr val="accent5">
-                <a:lumMod val="75000"/>
-              </a:schemeClr>
-            </a:solidFill>
-            <a:prstDash val="sysDash"/>
-            <a:headEnd type="none" w="lg" len="lg"/>
-            <a:tailEnd type="triangle" w="lg" len="lg"/>
-          </a:ln>
-        </p:spPr>
-        <p:style>
-          <a:lnRef idx="1">
-            <a:schemeClr val="accent1"/>
-          </a:lnRef>
-          <a:fillRef idx="0">
-            <a:schemeClr val="accent1"/>
-          </a:fillRef>
-          <a:effectRef idx="0">
-            <a:schemeClr val="accent1"/>
-          </a:effectRef>
-          <a:fontRef idx="minor">
-            <a:schemeClr val="tx1"/>
-          </a:fontRef>
-        </p:style>
-      </p:cxnSp>
     </p:spTree>
     <p:extLst>
       <p:ext uri="{BB962C8B-B14F-4D97-AF65-F5344CB8AC3E}">
-        <p14:creationId xmlns:p14="http://schemas.microsoft.com/office/powerpoint/2010/main" val="3093942814"/>
+        <p14:creationId xmlns:p14="http://schemas.microsoft.com/office/powerpoint/2010/main" val="3809416967"/>
       </p:ext>
     </p:extLst>
   </p:cSld>
@@ -4115,9 +5774,6 @@
                     <p:cTn id="3" fill="hold">
                       <p:stCondLst>
                         <p:cond delay="indefinite"/>
-                        <p:cond evt="onBegin" delay="0">
-                          <p:tn val="2"/>
-                        </p:cond>
                       </p:stCondLst>
                       <p:childTnLst>
                         <p:par>
@@ -4127,7 +5783,7 @@
                             </p:stCondLst>
                             <p:childTnLst>
                               <p:par>
-                                <p:cTn id="5" presetID="1" presetClass="entr" presetSubtype="0" fill="hold" nodeType="withEffect">
+                                <p:cTn id="5" presetID="1" presetClass="entr" presetSubtype="0" fill="hold" nodeType="clickEffect">
                                   <p:stCondLst>
                                     <p:cond delay="0"/>
                                   </p:stCondLst>
@@ -4140,7 +5796,7 @@
                                           </p:stCondLst>
                                         </p:cTn>
                                         <p:tgtEl>
-                                          <p:spTgt spid="8"/>
+                                          <p:spTgt spid="72"/>
                                         </p:tgtEl>
                                         <p:attrNameLst>
                                           <p:attrName>style.visibility</p:attrName>
@@ -4172,7 +5828,7 @@
                             </p:stCondLst>
                             <p:childTnLst>
                               <p:par>
-                                <p:cTn id="9" presetID="1" presetClass="entr" presetSubtype="0" fill="hold" grpId="0" nodeType="clickEffect">
+                                <p:cTn id="9" presetID="1" presetClass="entr" presetSubtype="0" fill="hold" nodeType="clickEffect">
                                   <p:stCondLst>
                                     <p:cond delay="0"/>
                                   </p:stCondLst>
@@ -4185,7 +5841,7 @@
                                           </p:stCondLst>
                                         </p:cTn>
                                         <p:tgtEl>
-                                          <p:spTgt spid="16"/>
+                                          <p:spTgt spid="71"/>
                                         </p:tgtEl>
                                         <p:attrNameLst>
                                           <p:attrName>style.visibility</p:attrName>
@@ -4198,26 +5854,35 @@
                                   </p:childTnLst>
                                 </p:cTn>
                               </p:par>
-                            </p:childTnLst>
-                          </p:cTn>
-                        </p:par>
-                      </p:childTnLst>
-                    </p:cTn>
-                  </p:par>
-                  <p:par>
-                    <p:cTn id="11" fill="hold">
-                      <p:stCondLst>
-                        <p:cond delay="indefinite"/>
-                      </p:stCondLst>
-                      <p:childTnLst>
-                        <p:par>
-                          <p:cTn id="12" fill="hold">
-                            <p:stCondLst>
-                              <p:cond delay="0"/>
-                            </p:stCondLst>
-                            <p:childTnLst>
                               <p:par>
-                                <p:cTn id="13" presetID="1" presetClass="entr" presetSubtype="0" fill="hold" nodeType="clickEffect">
+                                <p:cTn id="11" presetID="1" presetClass="entr" presetSubtype="0" fill="hold" nodeType="withEffect">
+                                  <p:stCondLst>
+                                    <p:cond delay="0"/>
+                                  </p:stCondLst>
+                                  <p:childTnLst>
+                                    <p:set>
+                                      <p:cBhvr>
+                                        <p:cTn id="12" dur="1" fill="hold">
+                                          <p:stCondLst>
+                                            <p:cond delay="0"/>
+                                          </p:stCondLst>
+                                        </p:cTn>
+                                        <p:tgtEl>
+                                          <p:spTgt spid="76"/>
+                                        </p:tgtEl>
+                                        <p:attrNameLst>
+                                          <p:attrName>style.visibility</p:attrName>
+                                        </p:attrNameLst>
+                                      </p:cBhvr>
+                                      <p:to>
+                                        <p:strVal val="visible"/>
+                                      </p:to>
+                                    </p:set>
+                                  </p:childTnLst>
+                                </p:cTn>
+                              </p:par>
+                              <p:par>
+                                <p:cTn id="13" presetID="1" presetClass="entr" presetSubtype="0" fill="hold" nodeType="withEffect">
                                   <p:stCondLst>
                                     <p:cond delay="0"/>
                                   </p:stCondLst>
@@ -4230,7 +5895,7 @@
                                           </p:stCondLst>
                                         </p:cTn>
                                         <p:tgtEl>
-                                          <p:spTgt spid="28"/>
+                                          <p:spTgt spid="87"/>
                                         </p:tgtEl>
                                         <p:attrNameLst>
                                           <p:attrName>style.visibility</p:attrName>
@@ -4257,7 +5922,7 @@
                                           </p:stCondLst>
                                         </p:cTn>
                                         <p:tgtEl>
-                                          <p:spTgt spid="33"/>
+                                          <p:spTgt spid="92"/>
                                         </p:tgtEl>
                                         <p:attrNameLst>
                                           <p:attrName>style.visibility</p:attrName>
@@ -4302,7 +5967,214 @@
                                           </p:stCondLst>
                                         </p:cTn>
                                         <p:tgtEl>
-                                          <p:spTgt spid="35"/>
+                                          <p:spTgt spid="100"/>
+                                        </p:tgtEl>
+                                        <p:attrNameLst>
+                                          <p:attrName>style.visibility</p:attrName>
+                                        </p:attrNameLst>
+                                      </p:cBhvr>
+                                      <p:to>
+                                        <p:strVal val="visible"/>
+                                      </p:to>
+                                    </p:set>
+                                  </p:childTnLst>
+                                </p:cTn>
+                              </p:par>
+                            </p:childTnLst>
+                          </p:cTn>
+                        </p:par>
+                      </p:childTnLst>
+                    </p:cTn>
+                  </p:par>
+                  <p:par>
+                    <p:cTn id="21" fill="hold">
+                      <p:stCondLst>
+                        <p:cond delay="indefinite"/>
+                      </p:stCondLst>
+                      <p:childTnLst>
+                        <p:par>
+                          <p:cTn id="22" fill="hold">
+                            <p:stCondLst>
+                              <p:cond delay="0"/>
+                            </p:stCondLst>
+                            <p:childTnLst>
+                              <p:par>
+                                <p:cTn id="23" presetID="1" presetClass="entr" presetSubtype="0" fill="hold" nodeType="clickEffect">
+                                  <p:stCondLst>
+                                    <p:cond delay="0"/>
+                                  </p:stCondLst>
+                                  <p:childTnLst>
+                                    <p:set>
+                                      <p:cBhvr>
+                                        <p:cTn id="24" dur="1" fill="hold">
+                                          <p:stCondLst>
+                                            <p:cond delay="0"/>
+                                          </p:stCondLst>
+                                        </p:cTn>
+                                        <p:tgtEl>
+                                          <p:spTgt spid="101"/>
+                                        </p:tgtEl>
+                                        <p:attrNameLst>
+                                          <p:attrName>style.visibility</p:attrName>
+                                        </p:attrNameLst>
+                                      </p:cBhvr>
+                                      <p:to>
+                                        <p:strVal val="visible"/>
+                                      </p:to>
+                                    </p:set>
+                                  </p:childTnLst>
+                                </p:cTn>
+                              </p:par>
+                              <p:par>
+                                <p:cTn id="25" presetID="1" presetClass="entr" presetSubtype="0" fill="hold" nodeType="withEffect">
+                                  <p:stCondLst>
+                                    <p:cond delay="0"/>
+                                  </p:stCondLst>
+                                  <p:childTnLst>
+                                    <p:set>
+                                      <p:cBhvr>
+                                        <p:cTn id="26" dur="1" fill="hold">
+                                          <p:stCondLst>
+                                            <p:cond delay="0"/>
+                                          </p:stCondLst>
+                                        </p:cTn>
+                                        <p:tgtEl>
+                                          <p:spTgt spid="102"/>
+                                        </p:tgtEl>
+                                        <p:attrNameLst>
+                                          <p:attrName>style.visibility</p:attrName>
+                                        </p:attrNameLst>
+                                      </p:cBhvr>
+                                      <p:to>
+                                        <p:strVal val="visible"/>
+                                      </p:to>
+                                    </p:set>
+                                  </p:childTnLst>
+                                </p:cTn>
+                              </p:par>
+                            </p:childTnLst>
+                          </p:cTn>
+                        </p:par>
+                      </p:childTnLst>
+                    </p:cTn>
+                  </p:par>
+                  <p:par>
+                    <p:cTn id="27" fill="hold">
+                      <p:stCondLst>
+                        <p:cond delay="indefinite"/>
+                      </p:stCondLst>
+                      <p:childTnLst>
+                        <p:par>
+                          <p:cTn id="28" fill="hold">
+                            <p:stCondLst>
+                              <p:cond delay="0"/>
+                            </p:stCondLst>
+                            <p:childTnLst>
+                              <p:par>
+                                <p:cTn id="29" presetID="1" presetClass="entr" presetSubtype="0" fill="hold" nodeType="clickEffect">
+                                  <p:stCondLst>
+                                    <p:cond delay="0"/>
+                                  </p:stCondLst>
+                                  <p:childTnLst>
+                                    <p:set>
+                                      <p:cBhvr>
+                                        <p:cTn id="30" dur="1" fill="hold">
+                                          <p:stCondLst>
+                                            <p:cond delay="0"/>
+                                          </p:stCondLst>
+                                        </p:cTn>
+                                        <p:tgtEl>
+                                          <p:spTgt spid="118"/>
+                                        </p:tgtEl>
+                                        <p:attrNameLst>
+                                          <p:attrName>style.visibility</p:attrName>
+                                        </p:attrNameLst>
+                                      </p:cBhvr>
+                                      <p:to>
+                                        <p:strVal val="visible"/>
+                                      </p:to>
+                                    </p:set>
+                                  </p:childTnLst>
+                                </p:cTn>
+                              </p:par>
+                            </p:childTnLst>
+                          </p:cTn>
+                        </p:par>
+                      </p:childTnLst>
+                    </p:cTn>
+                  </p:par>
+                  <p:par>
+                    <p:cTn id="31" fill="hold">
+                      <p:stCondLst>
+                        <p:cond delay="indefinite"/>
+                      </p:stCondLst>
+                      <p:childTnLst>
+                        <p:par>
+                          <p:cTn id="32" fill="hold">
+                            <p:stCondLst>
+                              <p:cond delay="0"/>
+                            </p:stCondLst>
+                            <p:childTnLst>
+                              <p:par>
+                                <p:cTn id="33" presetID="1" presetClass="entr" presetSubtype="0" fill="hold" nodeType="clickEffect">
+                                  <p:stCondLst>
+                                    <p:cond delay="0"/>
+                                  </p:stCondLst>
+                                  <p:childTnLst>
+                                    <p:set>
+                                      <p:cBhvr>
+                                        <p:cTn id="34" dur="1" fill="hold">
+                                          <p:stCondLst>
+                                            <p:cond delay="0"/>
+                                          </p:stCondLst>
+                                        </p:cTn>
+                                        <p:tgtEl>
+                                          <p:spTgt spid="121"/>
+                                        </p:tgtEl>
+                                        <p:attrNameLst>
+                                          <p:attrName>style.visibility</p:attrName>
+                                        </p:attrNameLst>
+                                      </p:cBhvr>
+                                      <p:to>
+                                        <p:strVal val="visible"/>
+                                      </p:to>
+                                    </p:set>
+                                  </p:childTnLst>
+                                </p:cTn>
+                              </p:par>
+                            </p:childTnLst>
+                          </p:cTn>
+                        </p:par>
+                      </p:childTnLst>
+                    </p:cTn>
+                  </p:par>
+                  <p:par>
+                    <p:cTn id="35" fill="hold">
+                      <p:stCondLst>
+                        <p:cond delay="indefinite"/>
+                      </p:stCondLst>
+                      <p:childTnLst>
+                        <p:par>
+                          <p:cTn id="36" fill="hold">
+                            <p:stCondLst>
+                              <p:cond delay="0"/>
+                            </p:stCondLst>
+                            <p:childTnLst>
+                              <p:par>
+                                <p:cTn id="37" presetID="1" presetClass="entr" presetSubtype="0" fill="hold" nodeType="clickEffect">
+                                  <p:stCondLst>
+                                    <p:cond delay="0"/>
+                                  </p:stCondLst>
+                                  <p:childTnLst>
+                                    <p:set>
+                                      <p:cBhvr>
+                                        <p:cTn id="38" dur="1" fill="hold">
+                                          <p:stCondLst>
+                                            <p:cond delay="0"/>
+                                          </p:stCondLst>
+                                        </p:cTn>
+                                        <p:tgtEl>
+                                          <p:spTgt spid="133"/>
                                         </p:tgtEl>
                                         <p:attrNameLst>
                                           <p:attrName>style.visibility</p:attrName>
@@ -4342,9 +6214,6 @@
         </p:cTn>
       </p:par>
     </p:tnLst>
-    <p:bldLst>
-      <p:bldP spid="16" grpId="0" animBg="1"/>
-    </p:bldLst>
   </p:timing>
 </p:sld>
 </file>
@@ -4642,4 +6511,299 @@
     </a:ext>
   </a:extLst>
 </a:theme>
+</file>
+
+<file path=ppt/theme/theme2.xml><?xml version="1.0" encoding="utf-8"?>
+<a:theme xmlns:a="http://schemas.openxmlformats.org/drawingml/2006/main" name="Tema do Office">
+  <a:themeElements>
+    <a:clrScheme name="Office">
+      <a:dk1>
+        <a:sysClr val="windowText" lastClr="000000"/>
+      </a:dk1>
+      <a:lt1>
+        <a:sysClr val="window" lastClr="FFFFFF"/>
+      </a:lt1>
+      <a:dk2>
+        <a:srgbClr val="44546A"/>
+      </a:dk2>
+      <a:lt2>
+        <a:srgbClr val="E7E6E6"/>
+      </a:lt2>
+      <a:accent1>
+        <a:srgbClr val="4472C4"/>
+      </a:accent1>
+      <a:accent2>
+        <a:srgbClr val="ED7D31"/>
+      </a:accent2>
+      <a:accent3>
+        <a:srgbClr val="A5A5A5"/>
+      </a:accent3>
+      <a:accent4>
+        <a:srgbClr val="FFC000"/>
+      </a:accent4>
+      <a:accent5>
+        <a:srgbClr val="5B9BD5"/>
+      </a:accent5>
+      <a:accent6>
+        <a:srgbClr val="70AD47"/>
+      </a:accent6>
+      <a:hlink>
+        <a:srgbClr val="0563C1"/>
+      </a:hlink>
+      <a:folHlink>
+        <a:srgbClr val="954F72"/>
+      </a:folHlink>
+    </a:clrScheme>
+    <a:fontScheme name="Office">
+      <a:majorFont>
+        <a:latin typeface="Calibri Light" panose="020F0302020204030204"/>
+        <a:ea typeface=""/>
+        <a:cs typeface=""/>
+        <a:font script="Jpan" typeface="游ゴシック Light"/>
+        <a:font script="Hang" typeface="맑은 고딕"/>
+        <a:font script="Hans" typeface="等线 Light"/>
+        <a:font script="Hant" typeface="新細明體"/>
+        <a:font script="Arab" typeface="Times New Roman"/>
+        <a:font script="Hebr" typeface="Times New Roman"/>
+        <a:font script="Thai" typeface="Angsana New"/>
+        <a:font script="Ethi" typeface="Nyala"/>
+        <a:font script="Beng" typeface="Vrinda"/>
+        <a:font script="Gujr" typeface="Shruti"/>
+        <a:font script="Khmr" typeface="MoolBoran"/>
+        <a:font script="Knda" typeface="Tunga"/>
+        <a:font script="Guru" typeface="Raavi"/>
+        <a:font script="Cans" typeface="Euphemia"/>
+        <a:font script="Cher" typeface="Plantagenet Cherokee"/>
+        <a:font script="Yiii" typeface="Microsoft Yi Baiti"/>
+        <a:font script="Tibt" typeface="Microsoft Himalaya"/>
+        <a:font script="Thaa" typeface="MV Boli"/>
+        <a:font script="Deva" typeface="Mangal"/>
+        <a:font script="Telu" typeface="Gautami"/>
+        <a:font script="Taml" typeface="Latha"/>
+        <a:font script="Syrc" typeface="Estrangelo Edessa"/>
+        <a:font script="Orya" typeface="Kalinga"/>
+        <a:font script="Mlym" typeface="Kartika"/>
+        <a:font script="Laoo" typeface="DokChampa"/>
+        <a:font script="Sinh" typeface="Iskoola Pota"/>
+        <a:font script="Mong" typeface="Mongolian Baiti"/>
+        <a:font script="Viet" typeface="Times New Roman"/>
+        <a:font script="Uigh" typeface="Microsoft Uighur"/>
+        <a:font script="Geor" typeface="Sylfaen"/>
+        <a:font script="Armn" typeface="Arial"/>
+        <a:font script="Bugi" typeface="Leelawadee UI"/>
+        <a:font script="Bopo" typeface="Microsoft JhengHei"/>
+        <a:font script="Java" typeface="Javanese Text"/>
+        <a:font script="Lisu" typeface="Segoe UI"/>
+        <a:font script="Mymr" typeface="Myanmar Text"/>
+        <a:font script="Nkoo" typeface="Ebrima"/>
+        <a:font script="Olck" typeface="Nirmala UI"/>
+        <a:font script="Osma" typeface="Ebrima"/>
+        <a:font script="Phag" typeface="Phagspa"/>
+        <a:font script="Syrn" typeface="Estrangelo Edessa"/>
+        <a:font script="Syrj" typeface="Estrangelo Edessa"/>
+        <a:font script="Syre" typeface="Estrangelo Edessa"/>
+        <a:font script="Sora" typeface="Nirmala UI"/>
+        <a:font script="Tale" typeface="Microsoft Tai Le"/>
+        <a:font script="Talu" typeface="Microsoft New Tai Lue"/>
+        <a:font script="Tfng" typeface="Ebrima"/>
+      </a:majorFont>
+      <a:minorFont>
+        <a:latin typeface="Calibri" panose="020F0502020204030204"/>
+        <a:ea typeface=""/>
+        <a:cs typeface=""/>
+        <a:font script="Jpan" typeface="游ゴシック"/>
+        <a:font script="Hang" typeface="맑은 고딕"/>
+        <a:font script="Hans" typeface="等线"/>
+        <a:font script="Hant" typeface="新細明體"/>
+        <a:font script="Arab" typeface="Arial"/>
+        <a:font script="Hebr" typeface="Arial"/>
+        <a:font script="Thai" typeface="Cordia New"/>
+        <a:font script="Ethi" typeface="Nyala"/>
+        <a:font script="Beng" typeface="Vrinda"/>
+        <a:font script="Gujr" typeface="Shruti"/>
+        <a:font script="Khmr" typeface="DaunPenh"/>
+        <a:font script="Knda" typeface="Tunga"/>
+        <a:font script="Guru" typeface="Raavi"/>
+        <a:font script="Cans" typeface="Euphemia"/>
+        <a:font script="Cher" typeface="Plantagenet Cherokee"/>
+        <a:font script="Yiii" typeface="Microsoft Yi Baiti"/>
+        <a:font script="Tibt" typeface="Microsoft Himalaya"/>
+        <a:font script="Thaa" typeface="MV Boli"/>
+        <a:font script="Deva" typeface="Mangal"/>
+        <a:font script="Telu" typeface="Gautami"/>
+        <a:font script="Taml" typeface="Latha"/>
+        <a:font script="Syrc" typeface="Estrangelo Edessa"/>
+        <a:font script="Orya" typeface="Kalinga"/>
+        <a:font script="Mlym" typeface="Kartika"/>
+        <a:font script="Laoo" typeface="DokChampa"/>
+        <a:font script="Sinh" typeface="Iskoola Pota"/>
+        <a:font script="Mong" typeface="Mongolian Baiti"/>
+        <a:font script="Viet" typeface="Arial"/>
+        <a:font script="Uigh" typeface="Microsoft Uighur"/>
+        <a:font script="Geor" typeface="Sylfaen"/>
+        <a:font script="Armn" typeface="Arial"/>
+        <a:font script="Bugi" typeface="Leelawadee UI"/>
+        <a:font script="Bopo" typeface="Microsoft JhengHei"/>
+        <a:font script="Java" typeface="Javanese Text"/>
+        <a:font script="Lisu" typeface="Segoe UI"/>
+        <a:font script="Mymr" typeface="Myanmar Text"/>
+        <a:font script="Nkoo" typeface="Ebrima"/>
+        <a:font script="Olck" typeface="Nirmala UI"/>
+        <a:font script="Osma" typeface="Ebrima"/>
+        <a:font script="Phag" typeface="Phagspa"/>
+        <a:font script="Syrn" typeface="Estrangelo Edessa"/>
+        <a:font script="Syrj" typeface="Estrangelo Edessa"/>
+        <a:font script="Syre" typeface="Estrangelo Edessa"/>
+        <a:font script="Sora" typeface="Nirmala UI"/>
+        <a:font script="Tale" typeface="Microsoft Tai Le"/>
+        <a:font script="Talu" typeface="Microsoft New Tai Lue"/>
+        <a:font script="Tfng" typeface="Ebrima"/>
+      </a:minorFont>
+    </a:fontScheme>
+    <a:fmtScheme name="Office">
+      <a:fillStyleLst>
+        <a:solidFill>
+          <a:schemeClr val="phClr"/>
+        </a:solidFill>
+        <a:gradFill rotWithShape="1">
+          <a:gsLst>
+            <a:gs pos="0">
+              <a:schemeClr val="phClr">
+                <a:lumMod val="110000"/>
+                <a:satMod val="105000"/>
+                <a:tint val="67000"/>
+              </a:schemeClr>
+            </a:gs>
+            <a:gs pos="50000">
+              <a:schemeClr val="phClr">
+                <a:lumMod val="105000"/>
+                <a:satMod val="103000"/>
+                <a:tint val="73000"/>
+              </a:schemeClr>
+            </a:gs>
+            <a:gs pos="100000">
+              <a:schemeClr val="phClr">
+                <a:lumMod val="105000"/>
+                <a:satMod val="109000"/>
+                <a:tint val="81000"/>
+              </a:schemeClr>
+            </a:gs>
+          </a:gsLst>
+          <a:lin ang="5400000" scaled="0"/>
+        </a:gradFill>
+        <a:gradFill rotWithShape="1">
+          <a:gsLst>
+            <a:gs pos="0">
+              <a:schemeClr val="phClr">
+                <a:satMod val="103000"/>
+                <a:lumMod val="102000"/>
+                <a:tint val="94000"/>
+              </a:schemeClr>
+            </a:gs>
+            <a:gs pos="50000">
+              <a:schemeClr val="phClr">
+                <a:satMod val="110000"/>
+                <a:lumMod val="100000"/>
+                <a:shade val="100000"/>
+              </a:schemeClr>
+            </a:gs>
+            <a:gs pos="100000">
+              <a:schemeClr val="phClr">
+                <a:lumMod val="99000"/>
+                <a:satMod val="120000"/>
+                <a:shade val="78000"/>
+              </a:schemeClr>
+            </a:gs>
+          </a:gsLst>
+          <a:lin ang="5400000" scaled="0"/>
+        </a:gradFill>
+      </a:fillStyleLst>
+      <a:lnStyleLst>
+        <a:ln w="6350" cap="flat" cmpd="sng" algn="ctr">
+          <a:solidFill>
+            <a:schemeClr val="phClr"/>
+          </a:solidFill>
+          <a:prstDash val="solid"/>
+          <a:miter lim="800000"/>
+        </a:ln>
+        <a:ln w="12700" cap="flat" cmpd="sng" algn="ctr">
+          <a:solidFill>
+            <a:schemeClr val="phClr"/>
+          </a:solidFill>
+          <a:prstDash val="solid"/>
+          <a:miter lim="800000"/>
+        </a:ln>
+        <a:ln w="19050" cap="flat" cmpd="sng" algn="ctr">
+          <a:solidFill>
+            <a:schemeClr val="phClr"/>
+          </a:solidFill>
+          <a:prstDash val="solid"/>
+          <a:miter lim="800000"/>
+        </a:ln>
+      </a:lnStyleLst>
+      <a:effectStyleLst>
+        <a:effectStyle>
+          <a:effectLst/>
+        </a:effectStyle>
+        <a:effectStyle>
+          <a:effectLst/>
+        </a:effectStyle>
+        <a:effectStyle>
+          <a:effectLst>
+            <a:outerShdw blurRad="57150" dist="19050" dir="5400000" algn="ctr" rotWithShape="0">
+              <a:srgbClr val="000000">
+                <a:alpha val="63000"/>
+              </a:srgbClr>
+            </a:outerShdw>
+          </a:effectLst>
+        </a:effectStyle>
+      </a:effectStyleLst>
+      <a:bgFillStyleLst>
+        <a:solidFill>
+          <a:schemeClr val="phClr"/>
+        </a:solidFill>
+        <a:solidFill>
+          <a:schemeClr val="phClr">
+            <a:tint val="95000"/>
+            <a:satMod val="170000"/>
+          </a:schemeClr>
+        </a:solidFill>
+        <a:gradFill rotWithShape="1">
+          <a:gsLst>
+            <a:gs pos="0">
+              <a:schemeClr val="phClr">
+                <a:tint val="93000"/>
+                <a:satMod val="150000"/>
+                <a:shade val="98000"/>
+                <a:lumMod val="102000"/>
+              </a:schemeClr>
+            </a:gs>
+            <a:gs pos="50000">
+              <a:schemeClr val="phClr">
+                <a:tint val="98000"/>
+                <a:satMod val="130000"/>
+                <a:shade val="90000"/>
+                <a:lumMod val="103000"/>
+              </a:schemeClr>
+            </a:gs>
+            <a:gs pos="100000">
+              <a:schemeClr val="phClr">
+                <a:shade val="63000"/>
+                <a:satMod val="120000"/>
+              </a:schemeClr>
+            </a:gs>
+          </a:gsLst>
+          <a:lin ang="5400000" scaled="0"/>
+        </a:gradFill>
+      </a:bgFillStyleLst>
+    </a:fmtScheme>
+  </a:themeElements>
+  <a:objectDefaults/>
+  <a:extraClrSchemeLst/>
+  <a:extLst>
+    <a:ext uri="{05A4C25C-085E-4340-85A3-A5531E510DB2}">
+      <thm15:themeFamily xmlns:thm15="http://schemas.microsoft.com/office/thememl/2012/main" name="Office Theme" id="{62F939B6-93AF-4DB8-9C6B-D6C7DFDC589F}" vid="{4A3C46E8-61CC-4603-A589-7422A47A8E4A}"/>
+    </a:ext>
+  </a:extLst>
+</a:theme>
 </file>
</xml_diff>